<commit_message>
restructured full paper. made lots of fixes
</commit_message>
<xml_diff>
--- a/full-paper/Images/manasi-demo-figures.pptx
+++ b/full-paper/Images/manasi-demo-figures.pptx
@@ -293,7 +293,7 @@
           <a:p>
             <a:fld id="{4B98F79D-D9B7-9C42-8302-8904B689693A}" type="datetimeFigureOut">
               <a:rPr lang="en-US" smtClean="0"/>
-              <a:t>3/5/14</a:t>
+              <a:t>10/26/14</a:t>
             </a:fld>
             <a:endParaRPr lang="en-US"/>
           </a:p>
@@ -463,7 +463,7 @@
           <a:p>
             <a:fld id="{4B98F79D-D9B7-9C42-8302-8904B689693A}" type="datetimeFigureOut">
               <a:rPr lang="en-US" smtClean="0"/>
-              <a:t>3/5/14</a:t>
+              <a:t>10/26/14</a:t>
             </a:fld>
             <a:endParaRPr lang="en-US"/>
           </a:p>
@@ -643,7 +643,7 @@
           <a:p>
             <a:fld id="{4B98F79D-D9B7-9C42-8302-8904B689693A}" type="datetimeFigureOut">
               <a:rPr lang="en-US" smtClean="0"/>
-              <a:t>3/5/14</a:t>
+              <a:t>10/26/14</a:t>
             </a:fld>
             <a:endParaRPr lang="en-US"/>
           </a:p>
@@ -813,7 +813,7 @@
           <a:p>
             <a:fld id="{4B98F79D-D9B7-9C42-8302-8904B689693A}" type="datetimeFigureOut">
               <a:rPr lang="en-US" smtClean="0"/>
-              <a:t>3/5/14</a:t>
+              <a:t>10/26/14</a:t>
             </a:fld>
             <a:endParaRPr lang="en-US"/>
           </a:p>
@@ -1059,7 +1059,7 @@
           <a:p>
             <a:fld id="{4B98F79D-D9B7-9C42-8302-8904B689693A}" type="datetimeFigureOut">
               <a:rPr lang="en-US" smtClean="0"/>
-              <a:t>3/5/14</a:t>
+              <a:t>10/26/14</a:t>
             </a:fld>
             <a:endParaRPr lang="en-US"/>
           </a:p>
@@ -1347,7 +1347,7 @@
           <a:p>
             <a:fld id="{4B98F79D-D9B7-9C42-8302-8904B689693A}" type="datetimeFigureOut">
               <a:rPr lang="en-US" smtClean="0"/>
-              <a:t>3/5/14</a:t>
+              <a:t>10/26/14</a:t>
             </a:fld>
             <a:endParaRPr lang="en-US"/>
           </a:p>
@@ -1769,7 +1769,7 @@
           <a:p>
             <a:fld id="{4B98F79D-D9B7-9C42-8302-8904B689693A}" type="datetimeFigureOut">
               <a:rPr lang="en-US" smtClean="0"/>
-              <a:t>3/5/14</a:t>
+              <a:t>10/26/14</a:t>
             </a:fld>
             <a:endParaRPr lang="en-US"/>
           </a:p>
@@ -1887,7 +1887,7 @@
           <a:p>
             <a:fld id="{4B98F79D-D9B7-9C42-8302-8904B689693A}" type="datetimeFigureOut">
               <a:rPr lang="en-US" smtClean="0"/>
-              <a:t>3/5/14</a:t>
+              <a:t>10/26/14</a:t>
             </a:fld>
             <a:endParaRPr lang="en-US"/>
           </a:p>
@@ -1982,7 +1982,7 @@
           <a:p>
             <a:fld id="{4B98F79D-D9B7-9C42-8302-8904B689693A}" type="datetimeFigureOut">
               <a:rPr lang="en-US" smtClean="0"/>
-              <a:t>3/5/14</a:t>
+              <a:t>10/26/14</a:t>
             </a:fld>
             <a:endParaRPr lang="en-US"/>
           </a:p>
@@ -2259,7 +2259,7 @@
           <a:p>
             <a:fld id="{4B98F79D-D9B7-9C42-8302-8904B689693A}" type="datetimeFigureOut">
               <a:rPr lang="en-US" smtClean="0"/>
-              <a:t>3/5/14</a:t>
+              <a:t>10/26/14</a:t>
             </a:fld>
             <a:endParaRPr lang="en-US"/>
           </a:p>
@@ -2512,7 +2512,7 @@
           <a:p>
             <a:fld id="{4B98F79D-D9B7-9C42-8302-8904B689693A}" type="datetimeFigureOut">
               <a:rPr lang="en-US" smtClean="0"/>
-              <a:t>3/5/14</a:t>
+              <a:t>10/26/14</a:t>
             </a:fld>
             <a:endParaRPr lang="en-US"/>
           </a:p>
@@ -2725,7 +2725,7 @@
           <a:p>
             <a:fld id="{4B98F79D-D9B7-9C42-8302-8904B689693A}" type="datetimeFigureOut">
               <a:rPr lang="en-US" smtClean="0"/>
-              <a:t>3/5/14</a:t>
+              <a:t>10/26/14</a:t>
             </a:fld>
             <a:endParaRPr lang="en-US"/>
           </a:p>
@@ -4993,260 +4993,6 @@
           </a:p>
         </p:txBody>
       </p:sp>
-      <p:grpSp>
-        <p:nvGrpSpPr>
-          <p:cNvPr id="79" name="Group 78"/>
-          <p:cNvGrpSpPr/>
-          <p:nvPr/>
-        </p:nvGrpSpPr>
-        <p:grpSpPr>
-          <a:xfrm>
-            <a:off x="7201475" y="2145526"/>
-            <a:ext cx="1689358" cy="1161166"/>
-            <a:chOff x="7287295" y="2145526"/>
-            <a:chExt cx="1689358" cy="1161166"/>
-          </a:xfrm>
-        </p:grpSpPr>
-        <p:sp>
-          <p:nvSpPr>
-            <p:cNvPr id="24" name="Rectangle 23"/>
-            <p:cNvSpPr/>
-            <p:nvPr/>
-          </p:nvSpPr>
-          <p:spPr>
-            <a:xfrm>
-              <a:off x="7867607" y="2598638"/>
-              <a:ext cx="708721" cy="708054"/>
-            </a:xfrm>
-            <a:prstGeom prst="rect">
-              <a:avLst/>
-            </a:prstGeom>
-            <a:solidFill>
-              <a:schemeClr val="bg1"/>
-            </a:solidFill>
-            <a:ln w="25400">
-              <a:solidFill>
-                <a:schemeClr val="tx1"/>
-              </a:solidFill>
-            </a:ln>
-            <a:effectLst/>
-          </p:spPr>
-          <p:style>
-            <a:lnRef idx="1">
-              <a:schemeClr val="accent1"/>
-            </a:lnRef>
-            <a:fillRef idx="3">
-              <a:schemeClr val="accent1"/>
-            </a:fillRef>
-            <a:effectRef idx="2">
-              <a:schemeClr val="accent1"/>
-            </a:effectRef>
-            <a:fontRef idx="minor">
-              <a:schemeClr val="lt1"/>
-            </a:fontRef>
-          </p:style>
-          <p:txBody>
-            <a:bodyPr lIns="68644" tIns="34322" rIns="68644" bIns="34322" rtlCol="0" anchor="ctr"/>
-            <a:lstStyle/>
-            <a:p>
-              <a:pPr algn="ctr"/>
-              <a:endParaRPr lang="en-US"/>
-            </a:p>
-          </p:txBody>
-        </p:sp>
-        <p:grpSp>
-          <p:nvGrpSpPr>
-            <p:cNvPr id="25" name="Group 45"/>
-            <p:cNvGrpSpPr/>
-            <p:nvPr/>
-          </p:nvGrpSpPr>
-          <p:grpSpPr>
-            <a:xfrm>
-              <a:off x="7903037" y="2668007"/>
-              <a:ext cx="637861" cy="557393"/>
-              <a:chOff x="10134600" y="553483"/>
-              <a:chExt cx="987553" cy="818117"/>
-            </a:xfrm>
-            <a:effectLst/>
-          </p:grpSpPr>
-          <p:pic>
-            <p:nvPicPr>
-              <p:cNvPr id="26" name="Picture 41" descr="Picture 3.PDF"/>
-              <p:cNvPicPr>
-                <a:picLocks noChangeAspect="1"/>
-              </p:cNvPicPr>
-              <p:nvPr/>
-            </p:nvPicPr>
-            <p:blipFill>
-              <a:blip r:embed="rId3" cstate="print"/>
-              <a:srcRect/>
-              <a:stretch>
-                <a:fillRect/>
-              </a:stretch>
-            </p:blipFill>
-            <p:spPr bwMode="auto">
-              <a:xfrm>
-                <a:off x="10134600" y="553483"/>
-                <a:ext cx="688173" cy="665717"/>
-              </a:xfrm>
-              <a:prstGeom prst="rect">
-                <a:avLst/>
-              </a:prstGeom>
-              <a:noFill/>
-              <a:ln w="9525">
-                <a:noFill/>
-                <a:miter lim="800000"/>
-                <a:headEnd/>
-                <a:tailEnd/>
-              </a:ln>
-            </p:spPr>
-          </p:pic>
-          <p:pic>
-            <p:nvPicPr>
-              <p:cNvPr id="27" name="Picture 26" descr="Picture 4.PDF"/>
-              <p:cNvPicPr>
-                <a:picLocks noChangeAspect="1"/>
-              </p:cNvPicPr>
-              <p:nvPr/>
-            </p:nvPicPr>
-            <p:blipFill>
-              <a:blip r:embed="rId4" cstate="print"/>
-              <a:srcRect/>
-              <a:stretch>
-                <a:fillRect/>
-              </a:stretch>
-            </p:blipFill>
-            <p:spPr bwMode="auto">
-              <a:xfrm>
-                <a:off x="10439400" y="705883"/>
-                <a:ext cx="682753" cy="665717"/>
-              </a:xfrm>
-              <a:prstGeom prst="rect">
-                <a:avLst/>
-              </a:prstGeom>
-              <a:noFill/>
-              <a:ln w="9525">
-                <a:noFill/>
-                <a:miter lim="800000"/>
-                <a:headEnd/>
-                <a:tailEnd/>
-              </a:ln>
-            </p:spPr>
-          </p:pic>
-        </p:grpSp>
-        <p:sp>
-          <p:nvSpPr>
-            <p:cNvPr id="31" name="Rectangle 30"/>
-            <p:cNvSpPr/>
-            <p:nvPr/>
-          </p:nvSpPr>
-          <p:spPr>
-            <a:xfrm>
-              <a:off x="7478408" y="2145526"/>
-              <a:ext cx="1498245" cy="338554"/>
-            </a:xfrm>
-            <a:prstGeom prst="rect">
-              <a:avLst/>
-            </a:prstGeom>
-            <a:effectLst/>
-          </p:spPr>
-          <p:txBody>
-            <a:bodyPr wrap="square">
-              <a:spAutoFit/>
-            </a:bodyPr>
-            <a:lstStyle/>
-            <a:p>
-              <a:pPr marL="342900" indent="-342900" algn="ctr"/>
-              <a:r>
-                <a:rPr lang="en-US" sz="1600" i="1" dirty="0" smtClean="0">
-                  <a:latin typeface="Calibri" charset="0"/>
-                  <a:ea typeface="Calibri" charset="0"/>
-                  <a:cs typeface="Calibri" charset="0"/>
-                </a:rPr>
-                <a:t>Backend DBMS</a:t>
-              </a:r>
-            </a:p>
-          </p:txBody>
-        </p:sp>
-        <p:cxnSp>
-          <p:nvCxnSpPr>
-            <p:cNvPr id="35" name="Elbow Connector 34"/>
-            <p:cNvCxnSpPr/>
-            <p:nvPr/>
-          </p:nvCxnSpPr>
-          <p:spPr>
-            <a:xfrm rot="10800000">
-              <a:off x="7289607" y="3139594"/>
-              <a:ext cx="578001" cy="2"/>
-            </a:xfrm>
-            <a:prstGeom prst="bentConnector3">
-              <a:avLst>
-                <a:gd name="adj1" fmla="val 50000"/>
-              </a:avLst>
-            </a:prstGeom>
-            <a:ln>
-              <a:solidFill>
-                <a:schemeClr val="tx1"/>
-              </a:solidFill>
-              <a:tailEnd type="triangle" w="lg" len="lg"/>
-            </a:ln>
-            <a:effectLst/>
-          </p:spPr>
-          <p:style>
-            <a:lnRef idx="2">
-              <a:schemeClr val="accent1"/>
-            </a:lnRef>
-            <a:fillRef idx="0">
-              <a:schemeClr val="accent1"/>
-            </a:fillRef>
-            <a:effectRef idx="1">
-              <a:schemeClr val="accent1"/>
-            </a:effectRef>
-            <a:fontRef idx="minor">
-              <a:schemeClr val="tx1"/>
-            </a:fontRef>
-          </p:style>
-        </p:cxnSp>
-        <p:cxnSp>
-          <p:nvCxnSpPr>
-            <p:cNvPr id="50" name="Elbow Connector 49"/>
-            <p:cNvCxnSpPr/>
-            <p:nvPr/>
-          </p:nvCxnSpPr>
-          <p:spPr>
-            <a:xfrm rot="10800000" flipH="1">
-              <a:off x="7287295" y="2760003"/>
-              <a:ext cx="595402" cy="2"/>
-            </a:xfrm>
-            <a:prstGeom prst="bentConnector3">
-              <a:avLst>
-                <a:gd name="adj1" fmla="val 50000"/>
-              </a:avLst>
-            </a:prstGeom>
-            <a:ln>
-              <a:solidFill>
-                <a:schemeClr val="tx1"/>
-              </a:solidFill>
-              <a:tailEnd type="triangle" w="lg" len="lg"/>
-            </a:ln>
-            <a:effectLst/>
-          </p:spPr>
-          <p:style>
-            <a:lnRef idx="2">
-              <a:schemeClr val="accent1"/>
-            </a:lnRef>
-            <a:fillRef idx="0">
-              <a:schemeClr val="accent1"/>
-            </a:fillRef>
-            <a:effectRef idx="1">
-              <a:schemeClr val="accent1"/>
-            </a:effectRef>
-            <a:fontRef idx="minor">
-              <a:schemeClr val="tx1"/>
-            </a:fontRef>
-          </p:style>
-        </p:cxnSp>
-      </p:grpSp>
       <p:sp>
         <p:nvSpPr>
           <p:cNvPr id="56" name="TextBox 55"/>
@@ -5589,10 +5335,10 @@
         </p:nvGrpSpPr>
         <p:grpSpPr>
           <a:xfrm>
-            <a:off x="4977490" y="1916896"/>
-            <a:ext cx="2209131" cy="3188134"/>
-            <a:chOff x="5269278" y="1916897"/>
-            <a:chExt cx="2209131" cy="2735595"/>
+            <a:off x="4977489" y="992234"/>
+            <a:ext cx="3913341" cy="5450681"/>
+            <a:chOff x="5269278" y="2197012"/>
+            <a:chExt cx="2209130" cy="2455480"/>
           </a:xfrm>
         </p:grpSpPr>
         <p:sp>
@@ -5603,8 +5349,8 @@
           </p:nvSpPr>
           <p:spPr>
             <a:xfrm>
-              <a:off x="5269278" y="1916897"/>
-              <a:ext cx="2209130" cy="2735595"/>
+              <a:off x="5269278" y="2197012"/>
+              <a:ext cx="2209130" cy="2455480"/>
             </a:xfrm>
             <a:prstGeom prst="roundRect">
               <a:avLst/>
@@ -5648,7 +5394,7 @@
           </p:nvSpPr>
           <p:spPr>
             <a:xfrm>
-              <a:off x="5402132" y="1945471"/>
+              <a:off x="5402132" y="2208695"/>
               <a:ext cx="1838325" cy="316907"/>
             </a:xfrm>
             <a:prstGeom prst="rect">
@@ -5669,11 +5415,7 @@
               </a:r>
               <a:r>
                 <a:rPr lang="en-US" b="1" dirty="0" smtClean="0"/>
-                <a:t> </a:t>
-              </a:r>
-              <a:r>
-                <a:rPr lang="en-US" b="1" dirty="0" smtClean="0"/>
-                <a:t>Backend</a:t>
+                <a:t> Backend</a:t>
               </a:r>
               <a:endParaRPr lang="en-US" b="1" dirty="0"/>
             </a:p>
@@ -5687,8 +5429,8 @@
           </p:nvSpPr>
           <p:spPr>
             <a:xfrm>
-              <a:off x="5462457" y="2490028"/>
-              <a:ext cx="1730375" cy="438751"/>
+              <a:off x="5780396" y="2490301"/>
+              <a:ext cx="1170174" cy="227409"/>
             </a:xfrm>
             <a:prstGeom prst="roundRect">
               <a:avLst/>
@@ -5728,66 +5470,7 @@
                     <a:schemeClr val="tx1"/>
                   </a:solidFill>
                 </a:rPr>
-                <a:t>Metadata Collector</a:t>
-              </a:r>
-              <a:endParaRPr lang="en-US" sz="1600" dirty="0">
-                <a:solidFill>
-                  <a:schemeClr val="tx1"/>
-                </a:solidFill>
-              </a:endParaRPr>
-            </a:p>
-          </p:txBody>
-        </p:sp>
-        <p:sp>
-          <p:nvSpPr>
-            <p:cNvPr id="30" name="Rounded Rectangle 29"/>
-            <p:cNvSpPr/>
-            <p:nvPr/>
-          </p:nvSpPr>
-          <p:spPr>
-            <a:xfrm>
-              <a:off x="5472724" y="3033937"/>
-              <a:ext cx="1735983" cy="427843"/>
-            </a:xfrm>
-            <a:prstGeom prst="roundRect">
-              <a:avLst/>
-            </a:prstGeom>
-            <a:solidFill>
-              <a:schemeClr val="bg1"/>
-            </a:solidFill>
-            <a:ln w="12700">
-              <a:solidFill>
-                <a:schemeClr val="tx1"/>
-              </a:solidFill>
-            </a:ln>
-            <a:effectLst/>
-          </p:spPr>
-          <p:style>
-            <a:lnRef idx="1">
-              <a:schemeClr val="accent1"/>
-            </a:lnRef>
-            <a:fillRef idx="3">
-              <a:schemeClr val="accent1"/>
-            </a:fillRef>
-            <a:effectRef idx="2">
-              <a:schemeClr val="accent1"/>
-            </a:effectRef>
-            <a:fontRef idx="minor">
-              <a:schemeClr val="lt1"/>
-            </a:fontRef>
-          </p:style>
-          <p:txBody>
-            <a:bodyPr rtlCol="0" anchor="ctr"/>
-            <a:lstStyle/>
-            <a:p>
-              <a:pPr algn="ctr"/>
-              <a:r>
-                <a:rPr lang="en-US" sz="1600" dirty="0" smtClean="0">
-                  <a:solidFill>
-                    <a:schemeClr val="tx1"/>
-                  </a:solidFill>
-                </a:rPr>
-                <a:t>Query Generator</a:t>
+                <a:t>View Generator</a:t>
               </a:r>
               <a:endParaRPr lang="en-US" sz="1600" dirty="0">
                 <a:solidFill>
@@ -5805,8 +5488,8 @@
           </p:nvCxnSpPr>
           <p:spPr>
             <a:xfrm>
-              <a:off x="5269278" y="2368604"/>
-              <a:ext cx="2209131" cy="0"/>
+              <a:off x="5276747" y="2389680"/>
+              <a:ext cx="2193644" cy="0"/>
             </a:xfrm>
             <a:prstGeom prst="line">
               <a:avLst/>
@@ -5842,8 +5525,8 @@
           </p:nvSpPr>
           <p:spPr>
             <a:xfrm>
-              <a:off x="5472724" y="4040730"/>
-              <a:ext cx="1735983" cy="493172"/>
+              <a:off x="5849637" y="4402176"/>
+              <a:ext cx="989273" cy="194561"/>
             </a:xfrm>
             <a:prstGeom prst="roundRect">
               <a:avLst/>
@@ -5947,9 +5630,9 @@
           <p:nvPr/>
         </p:nvCxnSpPr>
         <p:spPr>
-          <a:xfrm>
-            <a:off x="3893822" y="2803276"/>
-            <a:ext cx="1276847" cy="37228"/>
+          <a:xfrm flipV="1">
+            <a:off x="3893822" y="1895681"/>
+            <a:ext cx="1989082" cy="907595"/>
           </a:xfrm>
           <a:prstGeom prst="straightConnector1">
             <a:avLst/>
@@ -5985,14 +5668,13 @@
           <p:cNvPr id="58" name="Straight Arrow Connector 57"/>
           <p:cNvCxnSpPr>
             <a:stCxn id="62" idx="1"/>
-            <a:endCxn id="18" idx="3"/>
           </p:cNvCxnSpPr>
           <p:nvPr/>
         </p:nvCxnSpPr>
         <p:spPr>
           <a:xfrm flipH="1" flipV="1">
-            <a:off x="3893822" y="4127220"/>
-            <a:ext cx="1287114" cy="552224"/>
+            <a:off x="3876614" y="4747821"/>
+            <a:ext cx="2128946" cy="1355386"/>
           </a:xfrm>
           <a:prstGeom prst="straightConnector1">
             <a:avLst/>
@@ -6031,7 +5713,7 @@
         </p:nvSpPr>
         <p:spPr>
           <a:xfrm>
-            <a:off x="4034278" y="4386881"/>
+            <a:off x="4033156" y="4086320"/>
             <a:ext cx="997246" cy="830997"/>
           </a:xfrm>
           <a:prstGeom prst="rect">
@@ -6134,7 +5816,7 @@
           <p:nvPr/>
         </p:nvPicPr>
         <p:blipFill>
-          <a:blip r:embed="rId5">
+          <a:blip r:embed="rId3">
             <a:extLst>
               <a:ext uri="{28A0092B-C50C-407E-A947-70E740481C1C}">
                 <a14:useLocalDpi xmlns:a14="http://schemas.microsoft.com/office/drawing/2010/main" val="0"/>
@@ -6164,7 +5846,7 @@
           <p:nvPr/>
         </p:nvPicPr>
         <p:blipFill>
-          <a:blip r:embed="rId6">
+          <a:blip r:embed="rId4">
             <a:extLst>
               <a:ext uri="{28A0092B-C50C-407E-A947-70E740481C1C}">
                 <a14:useLocalDpi xmlns:a14="http://schemas.microsoft.com/office/drawing/2010/main" val="0"/>
@@ -6194,7 +5876,7 @@
           <p:nvPr/>
         </p:nvPicPr>
         <p:blipFill>
-          <a:blip r:embed="rId7">
+          <a:blip r:embed="rId5">
             <a:extLst>
               <a:ext uri="{28A0092B-C50C-407E-A947-70E740481C1C}">
                 <a14:useLocalDpi xmlns:a14="http://schemas.microsoft.com/office/drawing/2010/main" val="0"/>
@@ -6215,16 +5897,960 @@
           </a:prstGeom>
         </p:spPr>
       </p:pic>
-      <p:sp>
-        <p:nvSpPr>
-          <p:cNvPr id="40" name="Rounded Rectangle 39"/>
+      <p:grpSp>
+        <p:nvGrpSpPr>
+          <p:cNvPr id="43" name="Group 42"/>
+          <p:cNvGrpSpPr/>
+          <p:nvPr/>
+        </p:nvGrpSpPr>
+        <p:grpSpPr>
+          <a:xfrm>
+            <a:off x="5022022" y="2535657"/>
+            <a:ext cx="1993534" cy="2984166"/>
+            <a:chOff x="5141074" y="2535657"/>
+            <a:chExt cx="1993534" cy="2732796"/>
+          </a:xfrm>
+        </p:grpSpPr>
+        <p:sp>
+          <p:nvSpPr>
+            <p:cNvPr id="52" name="Rounded Rectangle 51"/>
+            <p:cNvSpPr/>
+            <p:nvPr/>
+          </p:nvSpPr>
+          <p:spPr>
+            <a:xfrm>
+              <a:off x="5227023" y="2535657"/>
+              <a:ext cx="1746408" cy="2732796"/>
+            </a:xfrm>
+            <a:prstGeom prst="roundRect">
+              <a:avLst/>
+            </a:prstGeom>
+            <a:ln/>
+          </p:spPr>
+          <p:style>
+            <a:lnRef idx="2">
+              <a:schemeClr val="accent3"/>
+            </a:lnRef>
+            <a:fillRef idx="1">
+              <a:schemeClr val="lt1"/>
+            </a:fillRef>
+            <a:effectRef idx="0">
+              <a:schemeClr val="accent3"/>
+            </a:effectRef>
+            <a:fontRef idx="minor">
+              <a:schemeClr val="dk1"/>
+            </a:fontRef>
+          </p:style>
+          <p:txBody>
+            <a:bodyPr rtlCol="0" anchor="ctr"/>
+            <a:lstStyle/>
+            <a:p>
+              <a:pPr algn="ctr"/>
+              <a:endParaRPr lang="en-US" sz="1600" dirty="0">
+                <a:solidFill>
+                  <a:schemeClr val="tx1"/>
+                </a:solidFill>
+              </a:endParaRPr>
+            </a:p>
+          </p:txBody>
+        </p:sp>
+        <p:grpSp>
+          <p:nvGrpSpPr>
+            <p:cNvPr id="79" name="Group 78"/>
+            <p:cNvGrpSpPr/>
+            <p:nvPr/>
+          </p:nvGrpSpPr>
+          <p:grpSpPr>
+            <a:xfrm>
+              <a:off x="5710769" y="3899122"/>
+              <a:ext cx="708721" cy="1068130"/>
+              <a:chOff x="7867607" y="2112804"/>
+              <a:chExt cx="708721" cy="1068130"/>
+            </a:xfrm>
+          </p:grpSpPr>
+          <p:sp>
+            <p:nvSpPr>
+              <p:cNvPr id="24" name="Rectangle 23"/>
+              <p:cNvSpPr/>
+              <p:nvPr/>
+            </p:nvSpPr>
+            <p:spPr>
+              <a:xfrm>
+                <a:off x="7867607" y="2472880"/>
+                <a:ext cx="708721" cy="708054"/>
+              </a:xfrm>
+              <a:prstGeom prst="rect">
+                <a:avLst/>
+              </a:prstGeom>
+              <a:solidFill>
+                <a:schemeClr val="bg1"/>
+              </a:solidFill>
+              <a:ln w="25400">
+                <a:solidFill>
+                  <a:schemeClr val="tx1"/>
+                </a:solidFill>
+              </a:ln>
+              <a:effectLst/>
+            </p:spPr>
+            <p:style>
+              <a:lnRef idx="1">
+                <a:schemeClr val="accent1"/>
+              </a:lnRef>
+              <a:fillRef idx="3">
+                <a:schemeClr val="accent1"/>
+              </a:fillRef>
+              <a:effectRef idx="2">
+                <a:schemeClr val="accent1"/>
+              </a:effectRef>
+              <a:fontRef idx="minor">
+                <a:schemeClr val="lt1"/>
+              </a:fontRef>
+            </p:style>
+            <p:txBody>
+              <a:bodyPr lIns="68644" tIns="34322" rIns="68644" bIns="34322" rtlCol="0" anchor="ctr"/>
+              <a:lstStyle/>
+              <a:p>
+                <a:pPr algn="ctr"/>
+                <a:endParaRPr lang="en-US"/>
+              </a:p>
+            </p:txBody>
+          </p:sp>
+          <p:grpSp>
+            <p:nvGrpSpPr>
+              <p:cNvPr id="25" name="Group 45"/>
+              <p:cNvGrpSpPr/>
+              <p:nvPr/>
+            </p:nvGrpSpPr>
+            <p:grpSpPr>
+              <a:xfrm>
+                <a:off x="7903037" y="2542253"/>
+                <a:ext cx="637861" cy="557390"/>
+                <a:chOff x="10134600" y="368911"/>
+                <a:chExt cx="987553" cy="818114"/>
+              </a:xfrm>
+              <a:effectLst/>
+            </p:grpSpPr>
+            <p:pic>
+              <p:nvPicPr>
+                <p:cNvPr id="26" name="Picture 41" descr="Picture 3.PDF"/>
+                <p:cNvPicPr>
+                  <a:picLocks noChangeAspect="1"/>
+                </p:cNvPicPr>
+                <p:nvPr/>
+              </p:nvPicPr>
+              <p:blipFill>
+                <a:blip r:embed="rId6" cstate="print"/>
+                <a:srcRect/>
+                <a:stretch>
+                  <a:fillRect/>
+                </a:stretch>
+              </p:blipFill>
+              <p:spPr bwMode="auto">
+                <a:xfrm>
+                  <a:off x="10134600" y="368911"/>
+                  <a:ext cx="688173" cy="665718"/>
+                </a:xfrm>
+                <a:prstGeom prst="rect">
+                  <a:avLst/>
+                </a:prstGeom>
+                <a:noFill/>
+                <a:ln w="9525">
+                  <a:noFill/>
+                  <a:miter lim="800000"/>
+                  <a:headEnd/>
+                  <a:tailEnd/>
+                </a:ln>
+              </p:spPr>
+            </p:pic>
+            <p:pic>
+              <p:nvPicPr>
+                <p:cNvPr id="27" name="Picture 26" descr="Picture 4.PDF"/>
+                <p:cNvPicPr>
+                  <a:picLocks noChangeAspect="1"/>
+                </p:cNvPicPr>
+                <p:nvPr/>
+              </p:nvPicPr>
+              <p:blipFill>
+                <a:blip r:embed="rId7" cstate="print"/>
+                <a:srcRect/>
+                <a:stretch>
+                  <a:fillRect/>
+                </a:stretch>
+              </p:blipFill>
+              <p:spPr bwMode="auto">
+                <a:xfrm>
+                  <a:off x="10439399" y="521310"/>
+                  <a:ext cx="682754" cy="665715"/>
+                </a:xfrm>
+                <a:prstGeom prst="rect">
+                  <a:avLst/>
+                </a:prstGeom>
+                <a:noFill/>
+                <a:ln w="9525">
+                  <a:noFill/>
+                  <a:miter lim="800000"/>
+                  <a:headEnd/>
+                  <a:tailEnd/>
+                </a:ln>
+              </p:spPr>
+            </p:pic>
+          </p:grpSp>
+          <p:cxnSp>
+            <p:nvCxnSpPr>
+              <p:cNvPr id="35" name="Elbow Connector 34"/>
+              <p:cNvCxnSpPr/>
+              <p:nvPr/>
+            </p:nvCxnSpPr>
+            <p:spPr>
+              <a:xfrm rot="16200000">
+                <a:off x="8174178" y="2258002"/>
+                <a:ext cx="290397" cy="2"/>
+              </a:xfrm>
+              <a:prstGeom prst="bentConnector3">
+                <a:avLst>
+                  <a:gd name="adj1" fmla="val 50000"/>
+                </a:avLst>
+              </a:prstGeom>
+              <a:ln>
+                <a:solidFill>
+                  <a:schemeClr val="tx1"/>
+                </a:solidFill>
+                <a:tailEnd type="triangle" w="lg" len="lg"/>
+              </a:ln>
+              <a:effectLst/>
+            </p:spPr>
+            <p:style>
+              <a:lnRef idx="2">
+                <a:schemeClr val="accent1"/>
+              </a:lnRef>
+              <a:fillRef idx="0">
+                <a:schemeClr val="accent1"/>
+              </a:fillRef>
+              <a:effectRef idx="1">
+                <a:schemeClr val="accent1"/>
+              </a:effectRef>
+              <a:fontRef idx="minor">
+                <a:schemeClr val="tx1"/>
+              </a:fontRef>
+            </p:style>
+          </p:cxnSp>
+          <p:cxnSp>
+            <p:nvCxnSpPr>
+              <p:cNvPr id="50" name="Elbow Connector 49"/>
+              <p:cNvCxnSpPr/>
+              <p:nvPr/>
+            </p:nvCxnSpPr>
+            <p:spPr>
+              <a:xfrm rot="16200000" flipH="1">
+                <a:off x="7955690" y="2271893"/>
+                <a:ext cx="290396" cy="2"/>
+              </a:xfrm>
+              <a:prstGeom prst="bentConnector3">
+                <a:avLst>
+                  <a:gd name="adj1" fmla="val 50000"/>
+                </a:avLst>
+              </a:prstGeom>
+              <a:ln>
+                <a:solidFill>
+                  <a:schemeClr val="tx1"/>
+                </a:solidFill>
+                <a:tailEnd type="triangle" w="lg" len="lg"/>
+              </a:ln>
+              <a:effectLst/>
+            </p:spPr>
+            <p:style>
+              <a:lnRef idx="2">
+                <a:schemeClr val="accent1"/>
+              </a:lnRef>
+              <a:fillRef idx="0">
+                <a:schemeClr val="accent1"/>
+              </a:fillRef>
+              <a:effectRef idx="1">
+                <a:schemeClr val="accent1"/>
+              </a:effectRef>
+              <a:fontRef idx="minor">
+                <a:schemeClr val="tx1"/>
+              </a:fontRef>
+            </p:style>
+          </p:cxnSp>
+        </p:grpSp>
+        <p:sp>
+          <p:nvSpPr>
+            <p:cNvPr id="40" name="Rounded Rectangle 39"/>
+            <p:cNvSpPr/>
+            <p:nvPr/>
+          </p:nvSpPr>
+          <p:spPr>
+            <a:xfrm>
+              <a:off x="5331884" y="3548985"/>
+              <a:ext cx="1454185" cy="302292"/>
+            </a:xfrm>
+            <a:prstGeom prst="roundRect">
+              <a:avLst/>
+            </a:prstGeom>
+            <a:solidFill>
+              <a:schemeClr val="bg1"/>
+            </a:solidFill>
+            <a:ln w="12700">
+              <a:solidFill>
+                <a:schemeClr val="tx1"/>
+              </a:solidFill>
+            </a:ln>
+            <a:effectLst/>
+          </p:spPr>
+          <p:style>
+            <a:lnRef idx="1">
+              <a:schemeClr val="accent1"/>
+            </a:lnRef>
+            <a:fillRef idx="3">
+              <a:schemeClr val="accent1"/>
+            </a:fillRef>
+            <a:effectRef idx="2">
+              <a:schemeClr val="accent1"/>
+            </a:effectRef>
+            <a:fontRef idx="minor">
+              <a:schemeClr val="lt1"/>
+            </a:fontRef>
+          </p:style>
+          <p:txBody>
+            <a:bodyPr rtlCol="0" anchor="ctr"/>
+            <a:lstStyle/>
+            <a:p>
+              <a:pPr algn="ctr"/>
+              <a:r>
+                <a:rPr lang="en-US" sz="1600" dirty="0" smtClean="0">
+                  <a:solidFill>
+                    <a:schemeClr val="tx1"/>
+                  </a:solidFill>
+                </a:rPr>
+                <a:t>SQL Queries</a:t>
+              </a:r>
+              <a:endParaRPr lang="en-US" sz="1600" dirty="0">
+                <a:solidFill>
+                  <a:schemeClr val="tx1"/>
+                </a:solidFill>
+              </a:endParaRPr>
+            </a:p>
+          </p:txBody>
+        </p:sp>
+        <p:cxnSp>
+          <p:nvCxnSpPr>
+            <p:cNvPr id="57" name="Straight Connector 56"/>
+            <p:cNvCxnSpPr/>
+            <p:nvPr/>
+          </p:nvCxnSpPr>
+          <p:spPr>
+            <a:xfrm>
+              <a:off x="5227024" y="3078232"/>
+              <a:ext cx="1754087" cy="0"/>
+            </a:xfrm>
+            <a:prstGeom prst="line">
+              <a:avLst/>
+            </a:prstGeom>
+            <a:ln>
+              <a:solidFill>
+                <a:schemeClr val="accent3"/>
+              </a:solidFill>
+              <a:tailEnd type="none" w="lg" len="lg"/>
+            </a:ln>
+            <a:effectLst/>
+          </p:spPr>
+          <p:style>
+            <a:lnRef idx="2">
+              <a:schemeClr val="accent1"/>
+            </a:lnRef>
+            <a:fillRef idx="0">
+              <a:schemeClr val="accent1"/>
+            </a:fillRef>
+            <a:effectRef idx="1">
+              <a:schemeClr val="accent1"/>
+            </a:effectRef>
+            <a:fontRef idx="minor">
+              <a:schemeClr val="tx1"/>
+            </a:fontRef>
+          </p:style>
+        </p:cxnSp>
+        <p:sp>
+          <p:nvSpPr>
+            <p:cNvPr id="59" name="Rectangle 58"/>
+            <p:cNvSpPr/>
+            <p:nvPr/>
+          </p:nvSpPr>
+          <p:spPr>
+            <a:xfrm>
+              <a:off x="5141074" y="2535657"/>
+              <a:ext cx="1993534" cy="584776"/>
+            </a:xfrm>
+            <a:prstGeom prst="rect">
+              <a:avLst/>
+            </a:prstGeom>
+            <a:effectLst/>
+          </p:spPr>
+          <p:txBody>
+            <a:bodyPr wrap="square">
+              <a:spAutoFit/>
+            </a:bodyPr>
+            <a:lstStyle/>
+            <a:p>
+              <a:pPr algn="ctr"/>
+              <a:r>
+                <a:rPr lang="en-US" sz="1600" dirty="0" smtClean="0"/>
+                <a:t>DBMS-based Execution Engine</a:t>
+              </a:r>
+              <a:endParaRPr lang="en-US" sz="1600" dirty="0"/>
+            </a:p>
+          </p:txBody>
+        </p:sp>
+      </p:grpSp>
+      <p:grpSp>
+        <p:nvGrpSpPr>
+          <p:cNvPr id="63" name="Group 62"/>
+          <p:cNvGrpSpPr/>
+          <p:nvPr/>
+        </p:nvGrpSpPr>
+        <p:grpSpPr>
+          <a:xfrm>
+            <a:off x="6887414" y="2780667"/>
+            <a:ext cx="1907586" cy="2739156"/>
+            <a:chOff x="5141074" y="2535657"/>
+            <a:chExt cx="1993534" cy="2530468"/>
+          </a:xfrm>
+        </p:grpSpPr>
+        <p:sp>
+          <p:nvSpPr>
+            <p:cNvPr id="64" name="Rounded Rectangle 63"/>
+            <p:cNvSpPr/>
+            <p:nvPr/>
+          </p:nvSpPr>
+          <p:spPr>
+            <a:xfrm>
+              <a:off x="5227021" y="2535657"/>
+              <a:ext cx="1854673" cy="2530468"/>
+            </a:xfrm>
+            <a:prstGeom prst="roundRect">
+              <a:avLst/>
+            </a:prstGeom>
+            <a:ln/>
+          </p:spPr>
+          <p:style>
+            <a:lnRef idx="2">
+              <a:schemeClr val="accent3"/>
+            </a:lnRef>
+            <a:fillRef idx="1">
+              <a:schemeClr val="lt1"/>
+            </a:fillRef>
+            <a:effectRef idx="0">
+              <a:schemeClr val="accent3"/>
+            </a:effectRef>
+            <a:fontRef idx="minor">
+              <a:schemeClr val="dk1"/>
+            </a:fontRef>
+          </p:style>
+          <p:txBody>
+            <a:bodyPr rtlCol="0" anchor="ctr"/>
+            <a:lstStyle/>
+            <a:p>
+              <a:pPr algn="ctr"/>
+              <a:endParaRPr lang="en-US" sz="1600" dirty="0">
+                <a:solidFill>
+                  <a:schemeClr val="tx1"/>
+                </a:solidFill>
+              </a:endParaRPr>
+            </a:p>
+          </p:txBody>
+        </p:sp>
+        <p:cxnSp>
+          <p:nvCxnSpPr>
+            <p:cNvPr id="67" name="Straight Connector 66"/>
+            <p:cNvCxnSpPr/>
+            <p:nvPr/>
+          </p:nvCxnSpPr>
+          <p:spPr>
+            <a:xfrm>
+              <a:off x="5227023" y="3114047"/>
+              <a:ext cx="1854672" cy="0"/>
+            </a:xfrm>
+            <a:prstGeom prst="line">
+              <a:avLst/>
+            </a:prstGeom>
+            <a:ln>
+              <a:solidFill>
+                <a:schemeClr val="accent3"/>
+              </a:solidFill>
+              <a:tailEnd type="none" w="lg" len="lg"/>
+            </a:ln>
+            <a:effectLst/>
+          </p:spPr>
+          <p:style>
+            <a:lnRef idx="2">
+              <a:schemeClr val="accent1"/>
+            </a:lnRef>
+            <a:fillRef idx="0">
+              <a:schemeClr val="accent1"/>
+            </a:fillRef>
+            <a:effectRef idx="1">
+              <a:schemeClr val="accent1"/>
+            </a:effectRef>
+            <a:fontRef idx="minor">
+              <a:schemeClr val="tx1"/>
+            </a:fontRef>
+          </p:style>
+        </p:cxnSp>
+        <p:sp>
+          <p:nvSpPr>
+            <p:cNvPr id="70" name="Rectangle 69"/>
+            <p:cNvSpPr/>
+            <p:nvPr/>
+          </p:nvSpPr>
+          <p:spPr>
+            <a:xfrm>
+              <a:off x="5141074" y="2535657"/>
+              <a:ext cx="1993534" cy="584776"/>
+            </a:xfrm>
+            <a:prstGeom prst="rect">
+              <a:avLst/>
+            </a:prstGeom>
+            <a:effectLst/>
+          </p:spPr>
+          <p:txBody>
+            <a:bodyPr wrap="square">
+              <a:spAutoFit/>
+            </a:bodyPr>
+            <a:lstStyle/>
+            <a:p>
+              <a:pPr algn="ctr"/>
+              <a:r>
+                <a:rPr lang="en-US" sz="1600" dirty="0" smtClean="0"/>
+                <a:t>Main Memory Execution Engine</a:t>
+              </a:r>
+              <a:endParaRPr lang="en-US" sz="1600" dirty="0"/>
+            </a:p>
+          </p:txBody>
+        </p:sp>
+      </p:grpSp>
+      <p:sp>
+        <p:nvSpPr>
+          <p:cNvPr id="45" name="Rectangle 44"/>
           <p:cNvSpPr/>
           <p:nvPr/>
         </p:nvSpPr>
         <p:spPr>
           <a:xfrm>
-            <a:off x="5183369" y="3817838"/>
-            <a:ext cx="1735983" cy="458368"/>
+            <a:off x="5595436" y="5159160"/>
+            <a:ext cx="692217" cy="338554"/>
+          </a:xfrm>
+          <a:prstGeom prst="rect">
+            <a:avLst/>
+          </a:prstGeom>
+        </p:spPr>
+        <p:txBody>
+          <a:bodyPr wrap="none">
+            <a:spAutoFit/>
+          </a:bodyPr>
+          <a:lstStyle/>
+          <a:p>
+            <a:r>
+              <a:rPr lang="en-US" sz="1600" dirty="0" smtClean="0"/>
+              <a:t>DBMS</a:t>
+            </a:r>
+            <a:endParaRPr lang="en-US" dirty="0"/>
+          </a:p>
+        </p:txBody>
+      </p:sp>
+      <p:sp>
+        <p:nvSpPr>
+          <p:cNvPr id="87" name="Rectangle 86"/>
+          <p:cNvSpPr/>
+          <p:nvPr/>
+        </p:nvSpPr>
+        <p:spPr>
+          <a:xfrm>
+            <a:off x="7515999" y="4434173"/>
+            <a:ext cx="708721" cy="708054"/>
+          </a:xfrm>
+          <a:prstGeom prst="rect">
+            <a:avLst/>
+          </a:prstGeom>
+          <a:solidFill>
+            <a:schemeClr val="bg1"/>
+          </a:solidFill>
+          <a:ln w="25400">
+            <a:solidFill>
+              <a:schemeClr val="tx1"/>
+            </a:solidFill>
+          </a:ln>
+          <a:effectLst/>
+        </p:spPr>
+        <p:style>
+          <a:lnRef idx="1">
+            <a:schemeClr val="accent1"/>
+          </a:lnRef>
+          <a:fillRef idx="3">
+            <a:schemeClr val="accent1"/>
+          </a:fillRef>
+          <a:effectRef idx="2">
+            <a:schemeClr val="accent1"/>
+          </a:effectRef>
+          <a:fontRef idx="minor">
+            <a:schemeClr val="lt1"/>
+          </a:fontRef>
+        </p:style>
+        <p:txBody>
+          <a:bodyPr lIns="68644" tIns="34322" rIns="68644" bIns="34322" rtlCol="0" anchor="ctr"/>
+          <a:lstStyle/>
+          <a:p>
+            <a:pPr algn="ctr"/>
+            <a:endParaRPr lang="en-US"/>
+          </a:p>
+        </p:txBody>
+      </p:sp>
+      <p:pic>
+        <p:nvPicPr>
+          <p:cNvPr id="46" name="Picture 45" descr="Filesystems-hd-icon.png"/>
+          <p:cNvPicPr>
+            <a:picLocks noChangeAspect="1"/>
+          </p:cNvPicPr>
+          <p:nvPr/>
+        </p:nvPicPr>
+        <p:blipFill>
+          <a:blip r:embed="rId8">
+            <a:extLst>
+              <a:ext uri="{28A0092B-C50C-407E-A947-70E740481C1C}">
+                <a14:useLocalDpi xmlns:a14="http://schemas.microsoft.com/office/drawing/2010/main" val="0"/>
+              </a:ext>
+            </a:extLst>
+          </a:blip>
+          <a:stretch>
+            <a:fillRect/>
+          </a:stretch>
+        </p:blipFill>
+        <p:spPr>
+          <a:xfrm>
+            <a:off x="7571368" y="4562420"/>
+            <a:ext cx="564013" cy="564013"/>
+          </a:xfrm>
+          <a:prstGeom prst="rect">
+            <a:avLst/>
+          </a:prstGeom>
+        </p:spPr>
+      </p:pic>
+      <p:sp>
+        <p:nvSpPr>
+          <p:cNvPr id="86" name="Rectangle 85"/>
+          <p:cNvSpPr/>
+          <p:nvPr/>
+        </p:nvSpPr>
+        <p:spPr>
+          <a:xfrm>
+            <a:off x="7331900" y="5111227"/>
+            <a:ext cx="1123725" cy="338554"/>
+          </a:xfrm>
+          <a:prstGeom prst="rect">
+            <a:avLst/>
+          </a:prstGeom>
+        </p:spPr>
+        <p:txBody>
+          <a:bodyPr wrap="none">
+            <a:spAutoFit/>
+          </a:bodyPr>
+          <a:lstStyle/>
+          <a:p>
+            <a:r>
+              <a:rPr lang="en-US" sz="1600" dirty="0" smtClean="0"/>
+              <a:t>File System</a:t>
+            </a:r>
+            <a:endParaRPr lang="en-US" dirty="0"/>
+          </a:p>
+        </p:txBody>
+      </p:sp>
+      <p:pic>
+        <p:nvPicPr>
+          <p:cNvPr id="47" name="Picture 46" descr="cpu.png"/>
+          <p:cNvPicPr>
+            <a:picLocks noChangeAspect="1"/>
+          </p:cNvPicPr>
+          <p:nvPr/>
+        </p:nvPicPr>
+        <p:blipFill>
+          <a:blip r:embed="rId9">
+            <a:extLst>
+              <a:ext uri="{28A0092B-C50C-407E-A947-70E740481C1C}">
+                <a14:useLocalDpi xmlns:a14="http://schemas.microsoft.com/office/drawing/2010/main" val="0"/>
+              </a:ext>
+            </a:extLst>
+          </a:blip>
+          <a:stretch>
+            <a:fillRect/>
+          </a:stretch>
+        </p:blipFill>
+        <p:spPr>
+          <a:xfrm>
+            <a:off x="7571369" y="3509895"/>
+            <a:ext cx="602382" cy="602382"/>
+          </a:xfrm>
+          <a:prstGeom prst="rect">
+            <a:avLst/>
+          </a:prstGeom>
+        </p:spPr>
+      </p:pic>
+      <p:cxnSp>
+        <p:nvCxnSpPr>
+          <p:cNvPr id="88" name="Elbow Connector 87"/>
+          <p:cNvCxnSpPr/>
+          <p:nvPr/>
+        </p:nvCxnSpPr>
+        <p:spPr>
+          <a:xfrm rot="16200000">
+            <a:off x="7844505" y="4237902"/>
+            <a:ext cx="274320" cy="2"/>
+          </a:xfrm>
+          <a:prstGeom prst="bentConnector3">
+            <a:avLst>
+              <a:gd name="adj1" fmla="val 50000"/>
+            </a:avLst>
+          </a:prstGeom>
+          <a:ln>
+            <a:solidFill>
+              <a:schemeClr val="tx1"/>
+            </a:solidFill>
+            <a:tailEnd type="triangle" w="lg" len="lg"/>
+          </a:ln>
+          <a:effectLst/>
+        </p:spPr>
+        <p:style>
+          <a:lnRef idx="2">
+            <a:schemeClr val="accent1"/>
+          </a:lnRef>
+          <a:fillRef idx="0">
+            <a:schemeClr val="accent1"/>
+          </a:fillRef>
+          <a:effectRef idx="1">
+            <a:schemeClr val="accent1"/>
+          </a:effectRef>
+          <a:fontRef idx="minor">
+            <a:schemeClr val="tx1"/>
+          </a:fontRef>
+        </p:style>
+      </p:cxnSp>
+      <p:cxnSp>
+        <p:nvCxnSpPr>
+          <p:cNvPr id="89" name="Elbow Connector 88"/>
+          <p:cNvCxnSpPr/>
+          <p:nvPr/>
+        </p:nvCxnSpPr>
+        <p:spPr>
+          <a:xfrm rot="16200000" flipH="1">
+            <a:off x="7626018" y="4263912"/>
+            <a:ext cx="274320" cy="2"/>
+          </a:xfrm>
+          <a:prstGeom prst="bentConnector3">
+            <a:avLst>
+              <a:gd name="adj1" fmla="val 50000"/>
+            </a:avLst>
+          </a:prstGeom>
+          <a:ln>
+            <a:solidFill>
+              <a:schemeClr val="tx1"/>
+            </a:solidFill>
+            <a:tailEnd type="triangle" w="lg" len="lg"/>
+          </a:ln>
+          <a:effectLst/>
+        </p:spPr>
+        <p:style>
+          <a:lnRef idx="2">
+            <a:schemeClr val="accent1"/>
+          </a:lnRef>
+          <a:fillRef idx="0">
+            <a:schemeClr val="accent1"/>
+          </a:fillRef>
+          <a:effectRef idx="1">
+            <a:schemeClr val="accent1"/>
+          </a:effectRef>
+          <a:fontRef idx="minor">
+            <a:schemeClr val="tx1"/>
+          </a:fontRef>
+        </p:style>
+      </p:cxnSp>
+      <p:cxnSp>
+        <p:nvCxnSpPr>
+          <p:cNvPr id="91" name="Elbow Connector 90"/>
+          <p:cNvCxnSpPr>
+            <a:stCxn id="29" idx="2"/>
+            <a:endCxn id="64" idx="0"/>
+          </p:cNvCxnSpPr>
+          <p:nvPr/>
+        </p:nvCxnSpPr>
+        <p:spPr>
+          <a:xfrm rot="16200000" flipH="1">
+            <a:off x="7071889" y="1995543"/>
+            <a:ext cx="632585" cy="937661"/>
+          </a:xfrm>
+          <a:prstGeom prst="bentConnector3">
+            <a:avLst>
+              <a:gd name="adj1" fmla="val 31178"/>
+            </a:avLst>
+          </a:prstGeom>
+          <a:ln w="19050" cmpd="sng">
+            <a:solidFill>
+              <a:schemeClr val="tx1"/>
+            </a:solidFill>
+            <a:tailEnd type="triangle" w="lg" len="lg"/>
+          </a:ln>
+          <a:effectLst/>
+        </p:spPr>
+        <p:style>
+          <a:lnRef idx="2">
+            <a:schemeClr val="accent1"/>
+          </a:lnRef>
+          <a:fillRef idx="0">
+            <a:schemeClr val="accent1"/>
+          </a:fillRef>
+          <a:effectRef idx="1">
+            <a:schemeClr val="accent1"/>
+          </a:effectRef>
+          <a:fontRef idx="minor">
+            <a:schemeClr val="tx1"/>
+          </a:fontRef>
+        </p:style>
+      </p:cxnSp>
+      <p:cxnSp>
+        <p:nvCxnSpPr>
+          <p:cNvPr id="92" name="Elbow Connector 91"/>
+          <p:cNvCxnSpPr>
+            <a:stCxn id="29" idx="2"/>
+            <a:endCxn id="52" idx="0"/>
+          </p:cNvCxnSpPr>
+          <p:nvPr/>
+        </p:nvCxnSpPr>
+        <p:spPr>
+          <a:xfrm rot="5400000">
+            <a:off x="6256476" y="1872781"/>
+            <a:ext cx="387575" cy="938176"/>
+          </a:xfrm>
+          <a:prstGeom prst="bentConnector3">
+            <a:avLst>
+              <a:gd name="adj1" fmla="val 50000"/>
+            </a:avLst>
+          </a:prstGeom>
+          <a:ln w="19050" cmpd="sng">
+            <a:solidFill>
+              <a:schemeClr val="tx1"/>
+            </a:solidFill>
+            <a:tailEnd type="triangle" w="lg" len="lg"/>
+          </a:ln>
+          <a:effectLst/>
+        </p:spPr>
+        <p:style>
+          <a:lnRef idx="2">
+            <a:schemeClr val="accent1"/>
+          </a:lnRef>
+          <a:fillRef idx="0">
+            <a:schemeClr val="accent1"/>
+          </a:fillRef>
+          <a:effectRef idx="1">
+            <a:schemeClr val="accent1"/>
+          </a:effectRef>
+          <a:fontRef idx="minor">
+            <a:schemeClr val="tx1"/>
+          </a:fontRef>
+        </p:style>
+      </p:cxnSp>
+      <p:cxnSp>
+        <p:nvCxnSpPr>
+          <p:cNvPr id="98" name="Straight Arrow Connector 97"/>
+          <p:cNvCxnSpPr>
+            <a:stCxn id="52" idx="2"/>
+            <a:endCxn id="62" idx="0"/>
+          </p:cNvCxnSpPr>
+          <p:nvPr/>
+        </p:nvCxnSpPr>
+        <p:spPr>
+          <a:xfrm>
+            <a:off x="5981175" y="5519823"/>
+            <a:ext cx="900604" cy="367440"/>
+          </a:xfrm>
+          <a:prstGeom prst="straightConnector1">
+            <a:avLst/>
+          </a:prstGeom>
+          <a:ln w="19050" cap="flat" cmpd="sng" algn="ctr">
+            <a:solidFill>
+              <a:schemeClr val="tx1"/>
+            </a:solidFill>
+            <a:prstDash val="solid"/>
+            <a:round/>
+            <a:headEnd type="none" w="med" len="med"/>
+            <a:tailEnd type="triangle" w="lg" len="lg"/>
+          </a:ln>
+          <a:effectLst/>
+        </p:spPr>
+        <p:style>
+          <a:lnRef idx="2">
+            <a:schemeClr val="accent1"/>
+          </a:lnRef>
+          <a:fillRef idx="0">
+            <a:schemeClr val="accent1"/>
+          </a:fillRef>
+          <a:effectRef idx="1">
+            <a:schemeClr val="accent1"/>
+          </a:effectRef>
+          <a:fontRef idx="minor">
+            <a:schemeClr val="tx1"/>
+          </a:fontRef>
+        </p:style>
+      </p:cxnSp>
+      <p:cxnSp>
+        <p:nvCxnSpPr>
+          <p:cNvPr id="101" name="Straight Arrow Connector 100"/>
+          <p:cNvCxnSpPr>
+            <a:stCxn id="64" idx="2"/>
+            <a:endCxn id="62" idx="0"/>
+          </p:cNvCxnSpPr>
+          <p:nvPr/>
+        </p:nvCxnSpPr>
+        <p:spPr>
+          <a:xfrm flipH="1">
+            <a:off x="6881779" y="5519823"/>
+            <a:ext cx="975233" cy="367440"/>
+          </a:xfrm>
+          <a:prstGeom prst="straightConnector1">
+            <a:avLst/>
+          </a:prstGeom>
+          <a:ln w="19050" cap="flat" cmpd="sng" algn="ctr">
+            <a:solidFill>
+              <a:schemeClr val="tx1"/>
+            </a:solidFill>
+            <a:prstDash val="solid"/>
+            <a:round/>
+            <a:headEnd type="none" w="med" len="med"/>
+            <a:tailEnd type="triangle" w="lg" len="lg"/>
+          </a:ln>
+          <a:effectLst/>
+        </p:spPr>
+        <p:style>
+          <a:lnRef idx="2">
+            <a:schemeClr val="accent1"/>
+          </a:lnRef>
+          <a:fillRef idx="0">
+            <a:schemeClr val="accent1"/>
+          </a:fillRef>
+          <a:effectRef idx="1">
+            <a:schemeClr val="accent1"/>
+          </a:effectRef>
+          <a:fontRef idx="minor">
+            <a:schemeClr val="tx1"/>
+          </a:fontRef>
+        </p:style>
+      </p:cxnSp>
+      <p:sp>
+        <p:nvSpPr>
+          <p:cNvPr id="114" name="Rounded Rectangle 113"/>
+          <p:cNvSpPr/>
+          <p:nvPr/>
+        </p:nvSpPr>
+        <p:spPr>
+          <a:xfrm>
+            <a:off x="5348997" y="3212474"/>
+            <a:ext cx="1172509" cy="330098"/>
           </a:xfrm>
           <a:prstGeom prst="roundRect">
             <a:avLst/>

</xml_diff>

<commit_message>
edits to execution engine in full paper. Fixes to main memory implementation
</commit_message>
<xml_diff>
--- a/full-paper/Images/manasi-demo-figures.pptx
+++ b/full-paper/Images/manasi-demo-figures.pptx
@@ -10,7 +10,8 @@
     <p:sldId id="258" r:id="rId4"/>
     <p:sldId id="259" r:id="rId5"/>
     <p:sldId id="260" r:id="rId6"/>
-    <p:sldId id="261" r:id="rId7"/>
+    <p:sldId id="262" r:id="rId7"/>
+    <p:sldId id="261" r:id="rId8"/>
   </p:sldIdLst>
   <p:sldSz cx="9144000" cy="6858000" type="screen4x3"/>
   <p:notesSz cx="6858000" cy="9144000"/>
@@ -4836,6 +4837,1153 @@
 </file>
 
 <file path=ppt/slides/slide6.xml><?xml version="1.0" encoding="utf-8"?>
+<p:sld xmlns:a="http://schemas.openxmlformats.org/drawingml/2006/main" xmlns:r="http://schemas.openxmlformats.org/officeDocument/2006/relationships" xmlns:p="http://schemas.openxmlformats.org/presentationml/2006/main">
+  <p:cSld>
+    <p:spTree>
+      <p:nvGrpSpPr>
+        <p:cNvPr id="1" name=""/>
+        <p:cNvGrpSpPr/>
+        <p:nvPr/>
+      </p:nvGrpSpPr>
+      <p:grpSpPr>
+        <a:xfrm>
+          <a:off x="0" y="0"/>
+          <a:ext cx="0" cy="0"/>
+          <a:chOff x="0" y="0"/>
+          <a:chExt cx="0" cy="0"/>
+        </a:xfrm>
+      </p:grpSpPr>
+      <p:grpSp>
+        <p:nvGrpSpPr>
+          <p:cNvPr id="68" name="Group 67"/>
+          <p:cNvGrpSpPr/>
+          <p:nvPr/>
+        </p:nvGrpSpPr>
+        <p:grpSpPr>
+          <a:xfrm>
+            <a:off x="335499" y="1456344"/>
+            <a:ext cx="586925" cy="780351"/>
+            <a:chOff x="713107" y="1456344"/>
+            <a:chExt cx="586925" cy="780351"/>
+          </a:xfrm>
+        </p:grpSpPr>
+        <p:pic>
+          <p:nvPicPr>
+            <p:cNvPr id="6" name="Picture 35" descr="person_icon.png"/>
+            <p:cNvPicPr>
+              <a:picLocks noChangeAspect="1"/>
+            </p:cNvPicPr>
+            <p:nvPr/>
+          </p:nvPicPr>
+          <p:blipFill>
+            <a:blip r:embed="rId2"/>
+            <a:srcRect/>
+            <a:stretch>
+              <a:fillRect/>
+            </a:stretch>
+          </p:blipFill>
+          <p:spPr bwMode="auto">
+            <a:xfrm>
+              <a:off x="727789" y="1769486"/>
+              <a:ext cx="438893" cy="467209"/>
+            </a:xfrm>
+            <a:prstGeom prst="rect">
+              <a:avLst/>
+            </a:prstGeom>
+            <a:noFill/>
+            <a:ln w="9525">
+              <a:noFill/>
+              <a:miter lim="800000"/>
+              <a:headEnd/>
+              <a:tailEnd/>
+            </a:ln>
+            <a:effectLst/>
+          </p:spPr>
+        </p:pic>
+        <p:sp>
+          <p:nvSpPr>
+            <p:cNvPr id="7" name="Rectangle 46"/>
+            <p:cNvSpPr>
+              <a:spLocks noChangeArrowheads="1"/>
+            </p:cNvSpPr>
+            <p:nvPr/>
+          </p:nvSpPr>
+          <p:spPr bwMode="auto">
+            <a:xfrm>
+              <a:off x="713107" y="1456344"/>
+              <a:ext cx="586925" cy="323151"/>
+            </a:xfrm>
+            <a:prstGeom prst="rect">
+              <a:avLst/>
+            </a:prstGeom>
+            <a:noFill/>
+            <a:ln w="9525">
+              <a:noFill/>
+              <a:miter lim="800000"/>
+              <a:headEnd/>
+              <a:tailEnd/>
+            </a:ln>
+            <a:effectLst/>
+          </p:spPr>
+          <p:txBody>
+            <a:bodyPr wrap="none" lIns="91427" tIns="45713" rIns="91427" bIns="45713">
+              <a:prstTxWarp prst="textNoShape">
+                <a:avLst/>
+              </a:prstTxWarp>
+              <a:spAutoFit/>
+            </a:bodyPr>
+            <a:lstStyle/>
+            <a:p>
+              <a:r>
+                <a:rPr lang="en-US" sz="1500" i="1" dirty="0">
+                  <a:latin typeface="Calibri" charset="0"/>
+                  <a:ea typeface="Calibri" charset="0"/>
+                  <a:cs typeface="Calibri" charset="0"/>
+                </a:rPr>
+                <a:t>User </a:t>
+              </a:r>
+              <a:endParaRPr lang="en-US" sz="1500" dirty="0"/>
+            </a:p>
+          </p:txBody>
+        </p:sp>
+      </p:grpSp>
+      <p:sp>
+        <p:nvSpPr>
+          <p:cNvPr id="28" name="Rectangle 50"/>
+          <p:cNvSpPr>
+            <a:spLocks noChangeArrowheads="1"/>
+          </p:cNvSpPr>
+          <p:nvPr/>
+        </p:nvSpPr>
+        <p:spPr bwMode="auto">
+          <a:xfrm>
+            <a:off x="4186210" y="2422509"/>
+            <a:ext cx="749644" cy="400095"/>
+          </a:xfrm>
+          <a:prstGeom prst="rect">
+            <a:avLst/>
+          </a:prstGeom>
+          <a:noFill/>
+          <a:ln w="9525">
+            <a:noFill/>
+            <a:miter lim="800000"/>
+            <a:headEnd/>
+            <a:tailEnd/>
+          </a:ln>
+          <a:effectLst/>
+        </p:spPr>
+        <p:txBody>
+          <a:bodyPr wrap="square" lIns="91427" tIns="45713" rIns="91427" bIns="45713">
+            <a:prstTxWarp prst="textNoShape">
+              <a:avLst/>
+            </a:prstTxWarp>
+            <a:spAutoFit/>
+          </a:bodyPr>
+          <a:lstStyle/>
+          <a:p>
+            <a:pPr algn="ctr"/>
+            <a:r>
+              <a:rPr lang="en-US" sz="2000" b="1" i="1" dirty="0" smtClean="0">
+                <a:latin typeface="Calibri" charset="0"/>
+                <a:ea typeface="Calibri" charset="0"/>
+                <a:cs typeface="Calibri" charset="0"/>
+              </a:rPr>
+              <a:t>Q</a:t>
+            </a:r>
+            <a:endParaRPr lang="en-US" sz="1600" dirty="0"/>
+          </a:p>
+        </p:txBody>
+      </p:sp>
+      <p:sp>
+        <p:nvSpPr>
+          <p:cNvPr id="56" name="TextBox 55"/>
+          <p:cNvSpPr txBox="1"/>
+          <p:nvPr/>
+        </p:nvSpPr>
+        <p:spPr>
+          <a:xfrm>
+            <a:off x="836145" y="1693804"/>
+            <a:ext cx="1223043" cy="584776"/>
+          </a:xfrm>
+          <a:prstGeom prst="rect">
+            <a:avLst/>
+          </a:prstGeom>
+          <a:noFill/>
+        </p:spPr>
+        <p:txBody>
+          <a:bodyPr wrap="square" rtlCol="0">
+            <a:spAutoFit/>
+          </a:bodyPr>
+          <a:lstStyle/>
+          <a:p>
+            <a:pPr algn="ctr"/>
+            <a:r>
+              <a:rPr lang="en-US" sz="1600" i="1" dirty="0" smtClean="0"/>
+              <a:t>Selection criteria</a:t>
+            </a:r>
+            <a:endParaRPr lang="en-US" sz="1600" i="1" dirty="0"/>
+          </a:p>
+        </p:txBody>
+      </p:sp>
+      <p:grpSp>
+        <p:nvGrpSpPr>
+          <p:cNvPr id="69" name="Group 68"/>
+          <p:cNvGrpSpPr/>
+          <p:nvPr/>
+        </p:nvGrpSpPr>
+        <p:grpSpPr>
+          <a:xfrm>
+            <a:off x="1785033" y="1926420"/>
+            <a:ext cx="2311319" cy="3342033"/>
+            <a:chOff x="2833556" y="1926421"/>
+            <a:chExt cx="2035176" cy="2921804"/>
+          </a:xfrm>
+        </p:grpSpPr>
+        <p:sp>
+          <p:nvSpPr>
+            <p:cNvPr id="16" name="Rectangle 15"/>
+            <p:cNvSpPr/>
+            <p:nvPr/>
+          </p:nvSpPr>
+          <p:spPr>
+            <a:xfrm>
+              <a:off x="2833556" y="1945471"/>
+              <a:ext cx="2035176" cy="369332"/>
+            </a:xfrm>
+            <a:prstGeom prst="rect">
+              <a:avLst/>
+            </a:prstGeom>
+            <a:effectLst/>
+          </p:spPr>
+          <p:txBody>
+            <a:bodyPr wrap="square">
+              <a:spAutoFit/>
+            </a:bodyPr>
+            <a:lstStyle/>
+            <a:p>
+              <a:pPr algn="ctr"/>
+              <a:r>
+                <a:rPr lang="en-US" b="1" dirty="0" err="1" smtClean="0"/>
+                <a:t>SeeDB</a:t>
+              </a:r>
+              <a:r>
+                <a:rPr lang="en-US" b="1" dirty="0" smtClean="0"/>
+                <a:t> Frontend</a:t>
+              </a:r>
+              <a:endParaRPr lang="en-US" b="1" dirty="0"/>
+            </a:p>
+          </p:txBody>
+        </p:sp>
+        <p:sp>
+          <p:nvSpPr>
+            <p:cNvPr id="17" name="Rounded Rectangle 16"/>
+            <p:cNvSpPr/>
+            <p:nvPr/>
+          </p:nvSpPr>
+          <p:spPr>
+            <a:xfrm>
+              <a:off x="2954209" y="2459052"/>
+              <a:ext cx="1736190" cy="362458"/>
+            </a:xfrm>
+            <a:prstGeom prst="roundRect">
+              <a:avLst/>
+            </a:prstGeom>
+            <a:solidFill>
+              <a:schemeClr val="bg1"/>
+            </a:solidFill>
+            <a:ln w="12700">
+              <a:solidFill>
+                <a:schemeClr val="tx1"/>
+              </a:solidFill>
+            </a:ln>
+            <a:effectLst/>
+          </p:spPr>
+          <p:style>
+            <a:lnRef idx="1">
+              <a:schemeClr val="accent1"/>
+            </a:lnRef>
+            <a:fillRef idx="3">
+              <a:schemeClr val="accent1"/>
+            </a:fillRef>
+            <a:effectRef idx="2">
+              <a:schemeClr val="accent1"/>
+            </a:effectRef>
+            <a:fontRef idx="minor">
+              <a:schemeClr val="lt1"/>
+            </a:fontRef>
+          </p:style>
+          <p:txBody>
+            <a:bodyPr lIns="68644" tIns="34322" rIns="68644" bIns="34322" rtlCol="0" anchor="ctr"/>
+            <a:lstStyle/>
+            <a:p>
+              <a:pPr algn="ctr"/>
+              <a:r>
+                <a:rPr lang="en-US" sz="1600" dirty="0" smtClean="0">
+                  <a:solidFill>
+                    <a:schemeClr val="tx1"/>
+                  </a:solidFill>
+                </a:rPr>
+                <a:t>Query Builder</a:t>
+              </a:r>
+              <a:endParaRPr lang="en-US" sz="1600" dirty="0">
+                <a:solidFill>
+                  <a:schemeClr val="tx1"/>
+                </a:solidFill>
+              </a:endParaRPr>
+            </a:p>
+          </p:txBody>
+        </p:sp>
+        <p:sp>
+          <p:nvSpPr>
+            <p:cNvPr id="18" name="Rounded Rectangle 17"/>
+            <p:cNvSpPr/>
+            <p:nvPr/>
+          </p:nvSpPr>
+          <p:spPr>
+            <a:xfrm>
+              <a:off x="2954209" y="2995632"/>
+              <a:ext cx="1736190" cy="1709719"/>
+            </a:xfrm>
+            <a:prstGeom prst="roundRect">
+              <a:avLst/>
+            </a:prstGeom>
+            <a:solidFill>
+              <a:schemeClr val="bg1">
+                <a:alpha val="0"/>
+              </a:schemeClr>
+            </a:solidFill>
+            <a:ln w="12700">
+              <a:solidFill>
+                <a:schemeClr val="tx1"/>
+              </a:solidFill>
+            </a:ln>
+            <a:effectLst/>
+          </p:spPr>
+          <p:style>
+            <a:lnRef idx="1">
+              <a:schemeClr val="accent1"/>
+            </a:lnRef>
+            <a:fillRef idx="3">
+              <a:schemeClr val="accent1"/>
+            </a:fillRef>
+            <a:effectRef idx="2">
+              <a:schemeClr val="accent1"/>
+            </a:effectRef>
+            <a:fontRef idx="minor">
+              <a:schemeClr val="lt1"/>
+            </a:fontRef>
+          </p:style>
+          <p:txBody>
+            <a:bodyPr lIns="68644" tIns="34322" rIns="68644" bIns="34322" rtlCol="0" anchor="ctr"/>
+            <a:lstStyle/>
+            <a:p>
+              <a:pPr algn="ctr"/>
+              <a:endParaRPr lang="en-US" sz="1600" dirty="0">
+                <a:solidFill>
+                  <a:schemeClr val="tx1"/>
+                </a:solidFill>
+              </a:endParaRPr>
+            </a:p>
+          </p:txBody>
+        </p:sp>
+        <p:sp>
+          <p:nvSpPr>
+            <p:cNvPr id="20" name="Rounded Rectangle 19"/>
+            <p:cNvSpPr/>
+            <p:nvPr/>
+          </p:nvSpPr>
+          <p:spPr>
+            <a:xfrm>
+              <a:off x="2833557" y="1926421"/>
+              <a:ext cx="2035175" cy="2921804"/>
+            </a:xfrm>
+            <a:prstGeom prst="roundRect">
+              <a:avLst/>
+            </a:prstGeom>
+            <a:noFill/>
+            <a:ln w="25400"/>
+            <a:effectLst/>
+          </p:spPr>
+          <p:style>
+            <a:lnRef idx="1">
+              <a:schemeClr val="accent1"/>
+            </a:lnRef>
+            <a:fillRef idx="3">
+              <a:schemeClr val="accent1"/>
+            </a:fillRef>
+            <a:effectRef idx="2">
+              <a:schemeClr val="accent1"/>
+            </a:effectRef>
+            <a:fontRef idx="minor">
+              <a:schemeClr val="lt1"/>
+            </a:fontRef>
+          </p:style>
+          <p:txBody>
+            <a:bodyPr rtlCol="0" anchor="ctr"/>
+            <a:lstStyle/>
+            <a:p>
+              <a:pPr algn="ctr"/>
+              <a:endParaRPr lang="en-US"/>
+            </a:p>
+          </p:txBody>
+        </p:sp>
+        <p:cxnSp>
+          <p:nvCxnSpPr>
+            <p:cNvPr id="21" name="Straight Connector 20"/>
+            <p:cNvCxnSpPr/>
+            <p:nvPr/>
+          </p:nvCxnSpPr>
+          <p:spPr>
+            <a:xfrm>
+              <a:off x="2833556" y="2307004"/>
+              <a:ext cx="2035176" cy="1588"/>
+            </a:xfrm>
+            <a:prstGeom prst="line">
+              <a:avLst/>
+            </a:prstGeom>
+            <a:ln>
+              <a:solidFill>
+                <a:schemeClr val="accent1"/>
+              </a:solidFill>
+              <a:tailEnd type="none" w="lg" len="lg"/>
+            </a:ln>
+            <a:effectLst/>
+          </p:spPr>
+          <p:style>
+            <a:lnRef idx="2">
+              <a:schemeClr val="accent1"/>
+            </a:lnRef>
+            <a:fillRef idx="0">
+              <a:schemeClr val="accent1"/>
+            </a:fillRef>
+            <a:effectRef idx="1">
+              <a:schemeClr val="accent1"/>
+            </a:effectRef>
+            <a:fontRef idx="minor">
+              <a:schemeClr val="tx1"/>
+            </a:fontRef>
+          </p:style>
+        </p:cxnSp>
+        <p:sp>
+          <p:nvSpPr>
+            <p:cNvPr id="4" name="TextBox 39"/>
+            <p:cNvSpPr txBox="1">
+              <a:spLocks noChangeArrowheads="1"/>
+            </p:cNvSpPr>
+            <p:nvPr/>
+          </p:nvSpPr>
+          <p:spPr bwMode="auto">
+            <a:xfrm>
+              <a:off x="2971374" y="3015406"/>
+              <a:ext cx="1703872" cy="584761"/>
+            </a:xfrm>
+            <a:prstGeom prst="rect">
+              <a:avLst/>
+            </a:prstGeom>
+            <a:solidFill>
+              <a:schemeClr val="bg1">
+                <a:alpha val="0"/>
+              </a:schemeClr>
+            </a:solidFill>
+            <a:ln w="9525">
+              <a:noFill/>
+              <a:miter lim="800000"/>
+              <a:headEnd/>
+              <a:tailEnd/>
+            </a:ln>
+            <a:effectLst/>
+          </p:spPr>
+          <p:txBody>
+            <a:bodyPr wrap="square" lIns="91427" tIns="45713" rIns="91427" bIns="45713">
+              <a:prstTxWarp prst="textNoShape">
+                <a:avLst/>
+              </a:prstTxWarp>
+              <a:spAutoFit/>
+            </a:bodyPr>
+            <a:lstStyle/>
+            <a:p>
+              <a:pPr algn="ctr"/>
+              <a:r>
+                <a:rPr lang="en-US" sz="1600" i="1" dirty="0" err="1" smtClean="0">
+                  <a:latin typeface="Calibri" charset="0"/>
+                  <a:ea typeface="Calibri" charset="0"/>
+                  <a:cs typeface="Calibri" charset="0"/>
+                </a:rPr>
+                <a:t>SeeDB</a:t>
+              </a:r>
+              <a:r>
+                <a:rPr lang="en-US" sz="1600" i="1" dirty="0" smtClean="0">
+                  <a:latin typeface="Calibri" charset="0"/>
+                  <a:ea typeface="Calibri" charset="0"/>
+                  <a:cs typeface="Calibri" charset="0"/>
+                </a:rPr>
+                <a:t> generated visualizations</a:t>
+              </a:r>
+              <a:endParaRPr lang="en-US" sz="1600" i="1" dirty="0">
+                <a:latin typeface="Calibri" charset="0"/>
+                <a:ea typeface="Calibri" charset="0"/>
+                <a:cs typeface="Calibri" charset="0"/>
+              </a:endParaRPr>
+            </a:p>
+          </p:txBody>
+        </p:sp>
+      </p:grpSp>
+      <p:grpSp>
+        <p:nvGrpSpPr>
+          <p:cNvPr id="73" name="Group 72"/>
+          <p:cNvGrpSpPr/>
+          <p:nvPr/>
+        </p:nvGrpSpPr>
+        <p:grpSpPr>
+          <a:xfrm>
+            <a:off x="4977490" y="1916896"/>
+            <a:ext cx="2209131" cy="3188134"/>
+            <a:chOff x="5269278" y="1916897"/>
+            <a:chExt cx="2209131" cy="2735595"/>
+          </a:xfrm>
+        </p:grpSpPr>
+        <p:sp>
+          <p:nvSpPr>
+            <p:cNvPr id="22" name="Rounded Rectangle 21"/>
+            <p:cNvSpPr/>
+            <p:nvPr/>
+          </p:nvSpPr>
+          <p:spPr>
+            <a:xfrm>
+              <a:off x="5269278" y="1916897"/>
+              <a:ext cx="2209130" cy="2735595"/>
+            </a:xfrm>
+            <a:prstGeom prst="roundRect">
+              <a:avLst/>
+            </a:prstGeom>
+            <a:noFill/>
+            <a:ln w="25400">
+              <a:solidFill>
+                <a:srgbClr val="FF0000"/>
+              </a:solidFill>
+            </a:ln>
+            <a:effectLst/>
+          </p:spPr>
+          <p:style>
+            <a:lnRef idx="1">
+              <a:schemeClr val="accent1"/>
+            </a:lnRef>
+            <a:fillRef idx="3">
+              <a:schemeClr val="accent1"/>
+            </a:fillRef>
+            <a:effectRef idx="2">
+              <a:schemeClr val="accent1"/>
+            </a:effectRef>
+            <a:fontRef idx="minor">
+              <a:schemeClr val="lt1"/>
+            </a:fontRef>
+          </p:style>
+          <p:txBody>
+            <a:bodyPr rtlCol="0" anchor="ctr"/>
+            <a:lstStyle/>
+            <a:p>
+              <a:pPr algn="ctr"/>
+              <a:endParaRPr lang="en-US"/>
+            </a:p>
+          </p:txBody>
+        </p:sp>
+        <p:sp>
+          <p:nvSpPr>
+            <p:cNvPr id="23" name="Rectangle 22"/>
+            <p:cNvSpPr/>
+            <p:nvPr/>
+          </p:nvSpPr>
+          <p:spPr>
+            <a:xfrm>
+              <a:off x="5402132" y="1945471"/>
+              <a:ext cx="1838325" cy="316907"/>
+            </a:xfrm>
+            <a:prstGeom prst="rect">
+              <a:avLst/>
+            </a:prstGeom>
+            <a:effectLst/>
+          </p:spPr>
+          <p:txBody>
+            <a:bodyPr wrap="square">
+              <a:spAutoFit/>
+            </a:bodyPr>
+            <a:lstStyle/>
+            <a:p>
+              <a:pPr algn="ctr"/>
+              <a:r>
+                <a:rPr lang="en-US" b="1" dirty="0" err="1" smtClean="0"/>
+                <a:t>SeeDB</a:t>
+              </a:r>
+              <a:r>
+                <a:rPr lang="en-US" b="1" dirty="0" smtClean="0"/>
+                <a:t> </a:t>
+              </a:r>
+              <a:r>
+                <a:rPr lang="en-US" b="1" dirty="0" smtClean="0"/>
+                <a:t>Backend</a:t>
+              </a:r>
+              <a:endParaRPr lang="en-US" b="1" dirty="0"/>
+            </a:p>
+          </p:txBody>
+        </p:sp>
+        <p:sp>
+          <p:nvSpPr>
+            <p:cNvPr id="29" name="Rounded Rectangle 28"/>
+            <p:cNvSpPr/>
+            <p:nvPr/>
+          </p:nvSpPr>
+          <p:spPr>
+            <a:xfrm>
+              <a:off x="5475685" y="2511822"/>
+              <a:ext cx="1730375" cy="395270"/>
+            </a:xfrm>
+            <a:prstGeom prst="roundRect">
+              <a:avLst/>
+            </a:prstGeom>
+            <a:solidFill>
+              <a:schemeClr val="bg1"/>
+            </a:solidFill>
+            <a:ln w="12700">
+              <a:solidFill>
+                <a:schemeClr val="tx1"/>
+              </a:solidFill>
+            </a:ln>
+            <a:effectLst/>
+          </p:spPr>
+          <p:style>
+            <a:lnRef idx="1">
+              <a:schemeClr val="accent1"/>
+            </a:lnRef>
+            <a:fillRef idx="3">
+              <a:schemeClr val="accent1"/>
+            </a:fillRef>
+            <a:effectRef idx="2">
+              <a:schemeClr val="accent1"/>
+            </a:effectRef>
+            <a:fontRef idx="minor">
+              <a:schemeClr val="lt1"/>
+            </a:fontRef>
+          </p:style>
+          <p:txBody>
+            <a:bodyPr lIns="68644" tIns="34322" rIns="68644" bIns="34322" rtlCol="0" anchor="ctr"/>
+            <a:lstStyle/>
+            <a:p>
+              <a:pPr algn="ctr"/>
+              <a:r>
+                <a:rPr lang="en-US" sz="1600" dirty="0" smtClean="0">
+                  <a:solidFill>
+                    <a:schemeClr val="tx1"/>
+                  </a:solidFill>
+                </a:rPr>
+                <a:t>View </a:t>
+              </a:r>
+              <a:r>
+                <a:rPr lang="en-US" sz="1600" dirty="0" smtClean="0">
+                  <a:solidFill>
+                    <a:schemeClr val="tx1"/>
+                  </a:solidFill>
+                </a:rPr>
+                <a:t>Generator</a:t>
+              </a:r>
+              <a:endParaRPr lang="en-US" sz="1600" dirty="0">
+                <a:solidFill>
+                  <a:schemeClr val="tx1"/>
+                </a:solidFill>
+              </a:endParaRPr>
+            </a:p>
+          </p:txBody>
+        </p:sp>
+        <p:sp>
+          <p:nvSpPr>
+            <p:cNvPr id="30" name="Rounded Rectangle 29"/>
+            <p:cNvSpPr/>
+            <p:nvPr/>
+          </p:nvSpPr>
+          <p:spPr>
+            <a:xfrm>
+              <a:off x="5485952" y="3059343"/>
+              <a:ext cx="1735983" cy="949560"/>
+            </a:xfrm>
+            <a:prstGeom prst="roundRect">
+              <a:avLst/>
+            </a:prstGeom>
+            <a:solidFill>
+              <a:schemeClr val="bg1"/>
+            </a:solidFill>
+            <a:ln w="12700">
+              <a:solidFill>
+                <a:schemeClr val="tx1"/>
+              </a:solidFill>
+            </a:ln>
+            <a:effectLst/>
+          </p:spPr>
+          <p:style>
+            <a:lnRef idx="1">
+              <a:schemeClr val="accent1"/>
+            </a:lnRef>
+            <a:fillRef idx="3">
+              <a:schemeClr val="accent1"/>
+            </a:fillRef>
+            <a:effectRef idx="2">
+              <a:schemeClr val="accent1"/>
+            </a:effectRef>
+            <a:fontRef idx="minor">
+              <a:schemeClr val="lt1"/>
+            </a:fontRef>
+          </p:style>
+          <p:txBody>
+            <a:bodyPr rtlCol="0" anchor="ctr"/>
+            <a:lstStyle/>
+            <a:p>
+              <a:pPr algn="ctr"/>
+              <a:r>
+                <a:rPr lang="en-US" sz="1600" dirty="0" smtClean="0">
+                  <a:solidFill>
+                    <a:schemeClr val="tx1"/>
+                  </a:solidFill>
+                </a:rPr>
+                <a:t>Execution Engine</a:t>
+              </a:r>
+              <a:endParaRPr lang="en-US" sz="1600" dirty="0">
+                <a:solidFill>
+                  <a:schemeClr val="tx1"/>
+                </a:solidFill>
+              </a:endParaRPr>
+            </a:p>
+          </p:txBody>
+        </p:sp>
+        <p:cxnSp>
+          <p:nvCxnSpPr>
+            <p:cNvPr id="33" name="Straight Connector 32"/>
+            <p:cNvCxnSpPr/>
+            <p:nvPr/>
+          </p:nvCxnSpPr>
+          <p:spPr>
+            <a:xfrm>
+              <a:off x="5269278" y="2368604"/>
+              <a:ext cx="2209131" cy="0"/>
+            </a:xfrm>
+            <a:prstGeom prst="line">
+              <a:avLst/>
+            </a:prstGeom>
+            <a:ln>
+              <a:solidFill>
+                <a:srgbClr val="FF0000"/>
+              </a:solidFill>
+              <a:tailEnd type="none" w="lg" len="lg"/>
+            </a:ln>
+            <a:effectLst/>
+          </p:spPr>
+          <p:style>
+            <a:lnRef idx="2">
+              <a:schemeClr val="accent1"/>
+            </a:lnRef>
+            <a:fillRef idx="0">
+              <a:schemeClr val="accent1"/>
+            </a:fillRef>
+            <a:effectRef idx="1">
+              <a:schemeClr val="accent1"/>
+            </a:effectRef>
+            <a:fontRef idx="minor">
+              <a:schemeClr val="tx1"/>
+            </a:fontRef>
+          </p:style>
+        </p:cxnSp>
+        <p:sp>
+          <p:nvSpPr>
+            <p:cNvPr id="62" name="Rounded Rectangle 61"/>
+            <p:cNvSpPr/>
+            <p:nvPr/>
+          </p:nvSpPr>
+          <p:spPr>
+            <a:xfrm>
+              <a:off x="5472724" y="4158141"/>
+              <a:ext cx="1735983" cy="341704"/>
+            </a:xfrm>
+            <a:prstGeom prst="roundRect">
+              <a:avLst/>
+            </a:prstGeom>
+            <a:solidFill>
+              <a:schemeClr val="bg1"/>
+            </a:solidFill>
+            <a:ln w="12700">
+              <a:solidFill>
+                <a:schemeClr val="tx1"/>
+              </a:solidFill>
+            </a:ln>
+            <a:effectLst/>
+          </p:spPr>
+          <p:style>
+            <a:lnRef idx="1">
+              <a:schemeClr val="accent1"/>
+            </a:lnRef>
+            <a:fillRef idx="3">
+              <a:schemeClr val="accent1"/>
+            </a:fillRef>
+            <a:effectRef idx="2">
+              <a:schemeClr val="accent1"/>
+            </a:effectRef>
+            <a:fontRef idx="minor">
+              <a:schemeClr val="lt1"/>
+            </a:fontRef>
+          </p:style>
+          <p:txBody>
+            <a:bodyPr rtlCol="0" anchor="ctr"/>
+            <a:lstStyle/>
+            <a:p>
+              <a:pPr algn="ctr"/>
+              <a:r>
+                <a:rPr lang="en-US" sz="1600" dirty="0" smtClean="0">
+                  <a:solidFill>
+                    <a:schemeClr val="tx1"/>
+                  </a:solidFill>
+                </a:rPr>
+                <a:t>View Processor</a:t>
+              </a:r>
+              <a:endParaRPr lang="en-US" sz="1600" dirty="0">
+                <a:solidFill>
+                  <a:schemeClr val="tx1"/>
+                </a:solidFill>
+              </a:endParaRPr>
+            </a:p>
+          </p:txBody>
+        </p:sp>
+      </p:grpSp>
+      <p:cxnSp>
+        <p:nvCxnSpPr>
+          <p:cNvPr id="8" name="Straight Arrow Connector 7"/>
+          <p:cNvCxnSpPr>
+            <a:stCxn id="6" idx="3"/>
+            <a:endCxn id="17" idx="1"/>
+          </p:cNvCxnSpPr>
+          <p:nvPr/>
+        </p:nvCxnSpPr>
+        <p:spPr>
+          <a:xfrm>
+            <a:off x="789074" y="2003091"/>
+            <a:ext cx="1132983" cy="739861"/>
+          </a:xfrm>
+          <a:prstGeom prst="straightConnector1">
+            <a:avLst/>
+          </a:prstGeom>
+          <a:ln w="31750" cap="flat" cmpd="sng" algn="ctr">
+            <a:solidFill>
+              <a:schemeClr val="tx1"/>
+            </a:solidFill>
+            <a:prstDash val="solid"/>
+            <a:round/>
+            <a:headEnd type="none" w="med" len="med"/>
+            <a:tailEnd type="triangle" w="lg" len="lg"/>
+          </a:ln>
+          <a:effectLst/>
+        </p:spPr>
+        <p:style>
+          <a:lnRef idx="2">
+            <a:schemeClr val="accent1"/>
+          </a:lnRef>
+          <a:fillRef idx="0">
+            <a:schemeClr val="accent1"/>
+          </a:fillRef>
+          <a:effectRef idx="1">
+            <a:schemeClr val="accent1"/>
+          </a:effectRef>
+          <a:fontRef idx="minor">
+            <a:schemeClr val="tx1"/>
+          </a:fontRef>
+        </p:style>
+      </p:cxnSp>
+      <p:cxnSp>
+        <p:nvCxnSpPr>
+          <p:cNvPr id="39" name="Straight Arrow Connector 38"/>
+          <p:cNvCxnSpPr>
+            <a:stCxn id="17" idx="3"/>
+            <a:endCxn id="29" idx="1"/>
+          </p:cNvCxnSpPr>
+          <p:nvPr/>
+        </p:nvCxnSpPr>
+        <p:spPr>
+          <a:xfrm>
+            <a:off x="3893822" y="2742952"/>
+            <a:ext cx="1290075" cy="97614"/>
+          </a:xfrm>
+          <a:prstGeom prst="straightConnector1">
+            <a:avLst/>
+          </a:prstGeom>
+          <a:ln w="31750" cap="flat" cmpd="sng" algn="ctr">
+            <a:solidFill>
+              <a:schemeClr val="tx1"/>
+            </a:solidFill>
+            <a:prstDash val="solid"/>
+            <a:round/>
+            <a:headEnd type="none" w="med" len="med"/>
+            <a:tailEnd type="triangle" w="lg" len="lg"/>
+          </a:ln>
+          <a:effectLst/>
+        </p:spPr>
+        <p:style>
+          <a:lnRef idx="2">
+            <a:schemeClr val="accent1"/>
+          </a:lnRef>
+          <a:fillRef idx="0">
+            <a:schemeClr val="accent1"/>
+          </a:fillRef>
+          <a:effectRef idx="1">
+            <a:schemeClr val="accent1"/>
+          </a:effectRef>
+          <a:fontRef idx="minor">
+            <a:schemeClr val="tx1"/>
+          </a:fontRef>
+        </p:style>
+      </p:cxnSp>
+      <p:cxnSp>
+        <p:nvCxnSpPr>
+          <p:cNvPr id="58" name="Straight Arrow Connector 57"/>
+          <p:cNvCxnSpPr>
+            <a:stCxn id="62" idx="1"/>
+            <a:endCxn id="18" idx="3"/>
+          </p:cNvCxnSpPr>
+          <p:nvPr/>
+        </p:nvCxnSpPr>
+        <p:spPr>
+          <a:xfrm flipH="1" flipV="1">
+            <a:off x="3893822" y="4127220"/>
+            <a:ext cx="1287114" cy="600796"/>
+          </a:xfrm>
+          <a:prstGeom prst="straightConnector1">
+            <a:avLst/>
+          </a:prstGeom>
+          <a:ln w="31750" cap="flat" cmpd="sng" algn="ctr">
+            <a:solidFill>
+              <a:schemeClr val="tx1"/>
+            </a:solidFill>
+            <a:prstDash val="solid"/>
+            <a:round/>
+            <a:headEnd type="none" w="med" len="med"/>
+            <a:tailEnd type="triangle" w="lg" len="lg"/>
+          </a:ln>
+          <a:effectLst/>
+        </p:spPr>
+        <p:style>
+          <a:lnRef idx="2">
+            <a:schemeClr val="accent1"/>
+          </a:lnRef>
+          <a:fillRef idx="0">
+            <a:schemeClr val="accent1"/>
+          </a:fillRef>
+          <a:effectRef idx="1">
+            <a:schemeClr val="accent1"/>
+          </a:effectRef>
+          <a:fontRef idx="minor">
+            <a:schemeClr val="tx1"/>
+          </a:fontRef>
+        </p:style>
+      </p:cxnSp>
+      <p:sp>
+        <p:nvSpPr>
+          <p:cNvPr id="75" name="TextBox 74"/>
+          <p:cNvSpPr txBox="1"/>
+          <p:nvPr/>
+        </p:nvSpPr>
+        <p:spPr>
+          <a:xfrm>
+            <a:off x="4041143" y="3494750"/>
+            <a:ext cx="997246" cy="830997"/>
+          </a:xfrm>
+          <a:prstGeom prst="rect">
+            <a:avLst/>
+          </a:prstGeom>
+          <a:noFill/>
+        </p:spPr>
+        <p:txBody>
+          <a:bodyPr wrap="square" rtlCol="0">
+            <a:spAutoFit/>
+          </a:bodyPr>
+          <a:lstStyle/>
+          <a:p>
+            <a:pPr algn="ctr"/>
+            <a:r>
+              <a:rPr lang="en-US" sz="1600" i="1" dirty="0" smtClean="0"/>
+              <a:t>Most relevant views</a:t>
+            </a:r>
+            <a:endParaRPr lang="en-US" sz="1600" i="1" dirty="0"/>
+          </a:p>
+        </p:txBody>
+      </p:sp>
+      <p:cxnSp>
+        <p:nvCxnSpPr>
+          <p:cNvPr id="77" name="Elbow Connector 76"/>
+          <p:cNvCxnSpPr>
+            <a:stCxn id="6" idx="2"/>
+            <a:endCxn id="18" idx="1"/>
+          </p:cNvCxnSpPr>
+          <p:nvPr/>
+        </p:nvCxnSpPr>
+        <p:spPr>
+          <a:xfrm rot="16200000" flipH="1">
+            <a:off x="300580" y="2505742"/>
+            <a:ext cx="1890525" cy="1352429"/>
+          </a:xfrm>
+          <a:prstGeom prst="bentConnector2">
+            <a:avLst/>
+          </a:prstGeom>
+          <a:ln w="28575" cmpd="sng">
+            <a:solidFill>
+              <a:schemeClr val="tx1"/>
+            </a:solidFill>
+            <a:headEnd type="triangle" w="lg" len="med"/>
+            <a:tailEnd type="triangle" w="lg" len="med"/>
+          </a:ln>
+        </p:spPr>
+        <p:style>
+          <a:lnRef idx="2">
+            <a:schemeClr val="accent1"/>
+          </a:lnRef>
+          <a:fillRef idx="0">
+            <a:schemeClr val="accent1"/>
+          </a:fillRef>
+          <a:effectRef idx="1">
+            <a:schemeClr val="accent1"/>
+          </a:effectRef>
+          <a:fontRef idx="minor">
+            <a:schemeClr val="tx1"/>
+          </a:fontRef>
+        </p:style>
+      </p:cxnSp>
+      <p:sp>
+        <p:nvSpPr>
+          <p:cNvPr id="78" name="TextBox 77"/>
+          <p:cNvSpPr txBox="1"/>
+          <p:nvPr/>
+        </p:nvSpPr>
+        <p:spPr>
+          <a:xfrm>
+            <a:off x="266843" y="4187306"/>
+            <a:ext cx="1586558" cy="830997"/>
+          </a:xfrm>
+          <a:prstGeom prst="rect">
+            <a:avLst/>
+          </a:prstGeom>
+          <a:noFill/>
+        </p:spPr>
+        <p:txBody>
+          <a:bodyPr wrap="square" rtlCol="0">
+            <a:spAutoFit/>
+          </a:bodyPr>
+          <a:lstStyle/>
+          <a:p>
+            <a:pPr algn="ctr"/>
+            <a:r>
+              <a:rPr lang="en-US" sz="1600" i="1" dirty="0" smtClean="0"/>
+              <a:t>View and interact with visualizations</a:t>
+            </a:r>
+            <a:endParaRPr lang="en-US" sz="1600" i="1" dirty="0"/>
+          </a:p>
+        </p:txBody>
+      </p:sp>
+      <p:pic>
+        <p:nvPicPr>
+          <p:cNvPr id="80" name="Picture 79" descr="Screen Shot 2013-12-07 at 12.59.15 PM.png"/>
+          <p:cNvPicPr>
+            <a:picLocks noChangeAspect="1"/>
+          </p:cNvPicPr>
+          <p:nvPr/>
+        </p:nvPicPr>
+        <p:blipFill>
+          <a:blip r:embed="rId3">
+            <a:extLst>
+              <a:ext uri="{28A0092B-C50C-407E-A947-70E740481C1C}">
+                <a14:useLocalDpi xmlns:a14="http://schemas.microsoft.com/office/drawing/2010/main" val="0"/>
+              </a:ext>
+            </a:extLst>
+          </a:blip>
+          <a:stretch>
+            <a:fillRect/>
+          </a:stretch>
+        </p:blipFill>
+        <p:spPr>
+          <a:xfrm>
+            <a:off x="2943710" y="3742745"/>
+            <a:ext cx="812800" cy="647700"/>
+          </a:xfrm>
+          <a:prstGeom prst="rect">
+            <a:avLst/>
+          </a:prstGeom>
+        </p:spPr>
+      </p:pic>
+      <p:pic>
+        <p:nvPicPr>
+          <p:cNvPr id="81" name="Picture 80" descr="Screen Shot 2013-12-07 at 1.00.04 PM.png"/>
+          <p:cNvPicPr>
+            <a:picLocks noChangeAspect="1"/>
+          </p:cNvPicPr>
+          <p:nvPr/>
+        </p:nvPicPr>
+        <p:blipFill>
+          <a:blip r:embed="rId4">
+            <a:extLst>
+              <a:ext uri="{28A0092B-C50C-407E-A947-70E740481C1C}">
+                <a14:useLocalDpi xmlns:a14="http://schemas.microsoft.com/office/drawing/2010/main" val="0"/>
+              </a:ext>
+            </a:extLst>
+          </a:blip>
+          <a:stretch>
+            <a:fillRect/>
+          </a:stretch>
+        </p:blipFill>
+        <p:spPr>
+          <a:xfrm>
+            <a:off x="2249674" y="3782465"/>
+            <a:ext cx="711200" cy="609600"/>
+          </a:xfrm>
+          <a:prstGeom prst="rect">
+            <a:avLst/>
+          </a:prstGeom>
+        </p:spPr>
+      </p:pic>
+      <p:pic>
+        <p:nvPicPr>
+          <p:cNvPr id="82" name="Picture 81" descr="Screen Shot 2013-12-07 at 1.00.47 PM.png"/>
+          <p:cNvPicPr>
+            <a:picLocks noChangeAspect="1"/>
+          </p:cNvPicPr>
+          <p:nvPr/>
+        </p:nvPicPr>
+        <p:blipFill>
+          <a:blip r:embed="rId5">
+            <a:extLst>
+              <a:ext uri="{28A0092B-C50C-407E-A947-70E740481C1C}">
+                <a14:useLocalDpi xmlns:a14="http://schemas.microsoft.com/office/drawing/2010/main" val="0"/>
+              </a:ext>
+            </a:extLst>
+          </a:blip>
+          <a:stretch>
+            <a:fillRect/>
+          </a:stretch>
+        </p:blipFill>
+        <p:spPr>
+          <a:xfrm>
+            <a:off x="2240746" y="4354974"/>
+            <a:ext cx="1371600" cy="647700"/>
+          </a:xfrm>
+          <a:prstGeom prst="rect">
+            <a:avLst/>
+          </a:prstGeom>
+        </p:spPr>
+      </p:pic>
+    </p:spTree>
+    <p:extLst>
+      <p:ext uri="{BB962C8B-B14F-4D97-AF65-F5344CB8AC3E}">
+        <p14:creationId xmlns:p14="http://schemas.microsoft.com/office/powerpoint/2010/main" val="816455124"/>
+      </p:ext>
+    </p:extLst>
+  </p:cSld>
+  <p:clrMapOvr>
+    <a:masterClrMapping/>
+  </p:clrMapOvr>
+</p:sld>
+</file>
+
+<file path=ppt/slides/slide7.xml><?xml version="1.0" encoding="utf-8"?>
 <p:sld xmlns:a="http://schemas.openxmlformats.org/drawingml/2006/main" xmlns:r="http://schemas.openxmlformats.org/officeDocument/2006/relationships" xmlns:p="http://schemas.openxmlformats.org/presentationml/2006/main">
   <p:cSld>
     <p:spTree>

</xml_diff>

<commit_message>
edits to full paper
</commit_message>
<xml_diff>
--- a/full-paper/Images/manasi-demo-figures.pptx
+++ b/full-paper/Images/manasi-demo-figures.pptx
@@ -12,6 +12,7 @@
     <p:sldId id="260" r:id="rId6"/>
     <p:sldId id="262" r:id="rId7"/>
     <p:sldId id="261" r:id="rId8"/>
+    <p:sldId id="263" r:id="rId9"/>
   </p:sldIdLst>
   <p:sldSz cx="9144000" cy="6858000" type="screen4x3"/>
   <p:notesSz cx="6858000" cy="9144000"/>
@@ -8052,6 +8053,983 @@
     <p:extLst>
       <p:ext uri="{BB962C8B-B14F-4D97-AF65-F5344CB8AC3E}">
         <p14:creationId xmlns:p14="http://schemas.microsoft.com/office/powerpoint/2010/main" val="986359047"/>
+      </p:ext>
+    </p:extLst>
+  </p:cSld>
+  <p:clrMapOvr>
+    <a:masterClrMapping/>
+  </p:clrMapOvr>
+</p:sld>
+</file>
+
+<file path=ppt/slides/slide8.xml><?xml version="1.0" encoding="utf-8"?>
+<p:sld xmlns:a="http://schemas.openxmlformats.org/drawingml/2006/main" xmlns:r="http://schemas.openxmlformats.org/officeDocument/2006/relationships" xmlns:p="http://schemas.openxmlformats.org/presentationml/2006/main">
+  <p:cSld>
+    <p:spTree>
+      <p:nvGrpSpPr>
+        <p:cNvPr id="1" name=""/>
+        <p:cNvGrpSpPr/>
+        <p:nvPr/>
+      </p:nvGrpSpPr>
+      <p:grpSpPr>
+        <a:xfrm>
+          <a:off x="0" y="0"/>
+          <a:ext cx="0" cy="0"/>
+          <a:chOff x="0" y="0"/>
+          <a:chExt cx="0" cy="0"/>
+        </a:xfrm>
+      </p:grpSpPr>
+      <p:cxnSp>
+        <p:nvCxnSpPr>
+          <p:cNvPr id="6" name="Straight Arrow Connector 5"/>
+          <p:cNvCxnSpPr/>
+          <p:nvPr/>
+        </p:nvCxnSpPr>
+        <p:spPr>
+          <a:xfrm flipV="1">
+            <a:off x="1380462" y="1124054"/>
+            <a:ext cx="0" cy="1828800"/>
+          </a:xfrm>
+          <a:prstGeom prst="straightConnector1">
+            <a:avLst/>
+          </a:prstGeom>
+          <a:ln w="31750" cap="flat" cmpd="sng" algn="ctr">
+            <a:solidFill>
+              <a:schemeClr val="tx1"/>
+            </a:solidFill>
+            <a:prstDash val="solid"/>
+            <a:round/>
+            <a:headEnd type="none" w="med" len="med"/>
+            <a:tailEnd type="triangle" w="lg" len="lg"/>
+          </a:ln>
+          <a:effectLst/>
+        </p:spPr>
+        <p:style>
+          <a:lnRef idx="2">
+            <a:schemeClr val="accent1"/>
+          </a:lnRef>
+          <a:fillRef idx="0">
+            <a:schemeClr val="accent1"/>
+          </a:fillRef>
+          <a:effectRef idx="1">
+            <a:schemeClr val="accent1"/>
+          </a:effectRef>
+          <a:fontRef idx="minor">
+            <a:schemeClr val="tx1"/>
+          </a:fontRef>
+        </p:style>
+      </p:cxnSp>
+      <p:cxnSp>
+        <p:nvCxnSpPr>
+          <p:cNvPr id="8" name="Straight Arrow Connector 7"/>
+          <p:cNvCxnSpPr/>
+          <p:nvPr/>
+        </p:nvCxnSpPr>
+        <p:spPr>
+          <a:xfrm rot="5400000" flipV="1">
+            <a:off x="3666462" y="666854"/>
+            <a:ext cx="0" cy="4572000"/>
+          </a:xfrm>
+          <a:prstGeom prst="straightConnector1">
+            <a:avLst/>
+          </a:prstGeom>
+          <a:ln w="31750" cap="flat" cmpd="sng" algn="ctr">
+            <a:solidFill>
+              <a:schemeClr val="tx1"/>
+            </a:solidFill>
+            <a:prstDash val="solid"/>
+            <a:round/>
+            <a:headEnd type="none" w="med" len="med"/>
+            <a:tailEnd type="triangle" w="lg" len="lg"/>
+          </a:ln>
+          <a:effectLst/>
+        </p:spPr>
+        <p:style>
+          <a:lnRef idx="2">
+            <a:schemeClr val="accent1"/>
+          </a:lnRef>
+          <a:fillRef idx="0">
+            <a:schemeClr val="accent1"/>
+          </a:fillRef>
+          <a:effectRef idx="1">
+            <a:schemeClr val="accent1"/>
+          </a:effectRef>
+          <a:fontRef idx="minor">
+            <a:schemeClr val="tx1"/>
+          </a:fontRef>
+        </p:style>
+      </p:cxnSp>
+      <p:cxnSp>
+        <p:nvCxnSpPr>
+          <p:cNvPr id="9" name="Straight Arrow Connector 8"/>
+          <p:cNvCxnSpPr/>
+          <p:nvPr/>
+        </p:nvCxnSpPr>
+        <p:spPr>
+          <a:xfrm rot="5400000" flipV="1">
+            <a:off x="2011783" y="2098343"/>
+            <a:ext cx="0" cy="457200"/>
+          </a:xfrm>
+          <a:prstGeom prst="straightConnector1">
+            <a:avLst/>
+          </a:prstGeom>
+          <a:ln w="31750" cap="flat" cmpd="sng" algn="ctr">
+            <a:solidFill>
+              <a:schemeClr val="tx1"/>
+            </a:solidFill>
+            <a:prstDash val="solid"/>
+            <a:round/>
+            <a:headEnd type="none" w="med" len="med"/>
+            <a:tailEnd type="none" w="lg" len="lg"/>
+          </a:ln>
+          <a:effectLst/>
+        </p:spPr>
+        <p:style>
+          <a:lnRef idx="2">
+            <a:schemeClr val="accent1"/>
+          </a:lnRef>
+          <a:fillRef idx="0">
+            <a:schemeClr val="accent1"/>
+          </a:fillRef>
+          <a:effectRef idx="1">
+            <a:schemeClr val="accent1"/>
+          </a:effectRef>
+          <a:fontRef idx="minor">
+            <a:schemeClr val="tx1"/>
+          </a:fontRef>
+        </p:style>
+      </p:cxnSp>
+      <p:cxnSp>
+        <p:nvCxnSpPr>
+          <p:cNvPr id="10" name="Straight Arrow Connector 9"/>
+          <p:cNvCxnSpPr/>
+          <p:nvPr/>
+        </p:nvCxnSpPr>
+        <p:spPr>
+          <a:xfrm rot="5400000" flipV="1">
+            <a:off x="2000323" y="1335858"/>
+            <a:ext cx="0" cy="457200"/>
+          </a:xfrm>
+          <a:prstGeom prst="straightConnector1">
+            <a:avLst/>
+          </a:prstGeom>
+          <a:ln w="31750" cap="flat" cmpd="sng" algn="ctr">
+            <a:solidFill>
+              <a:schemeClr val="tx1"/>
+            </a:solidFill>
+            <a:prstDash val="solid"/>
+            <a:round/>
+            <a:headEnd type="none" w="med" len="med"/>
+            <a:tailEnd type="none" w="lg" len="lg"/>
+          </a:ln>
+          <a:effectLst/>
+        </p:spPr>
+        <p:style>
+          <a:lnRef idx="2">
+            <a:schemeClr val="accent1"/>
+          </a:lnRef>
+          <a:fillRef idx="0">
+            <a:schemeClr val="accent1"/>
+          </a:fillRef>
+          <a:effectRef idx="1">
+            <a:schemeClr val="accent1"/>
+          </a:effectRef>
+          <a:fontRef idx="minor">
+            <a:schemeClr val="tx1"/>
+          </a:fontRef>
+        </p:style>
+      </p:cxnSp>
+      <p:cxnSp>
+        <p:nvCxnSpPr>
+          <p:cNvPr id="11" name="Straight Arrow Connector 10"/>
+          <p:cNvCxnSpPr/>
+          <p:nvPr/>
+        </p:nvCxnSpPr>
+        <p:spPr>
+          <a:xfrm rot="10800000" flipV="1">
+            <a:off x="2002514" y="2332796"/>
+            <a:ext cx="0" cy="621792"/>
+          </a:xfrm>
+          <a:prstGeom prst="straightConnector1">
+            <a:avLst/>
+          </a:prstGeom>
+          <a:ln w="31750" cap="flat" cmpd="sng" algn="ctr">
+            <a:solidFill>
+              <a:schemeClr val="tx1"/>
+            </a:solidFill>
+            <a:prstDash val="solid"/>
+            <a:round/>
+            <a:headEnd type="none" w="med" len="med"/>
+            <a:tailEnd type="none" w="lg" len="lg"/>
+          </a:ln>
+          <a:effectLst/>
+        </p:spPr>
+        <p:style>
+          <a:lnRef idx="2">
+            <a:schemeClr val="accent1"/>
+          </a:lnRef>
+          <a:fillRef idx="0">
+            <a:schemeClr val="accent1"/>
+          </a:fillRef>
+          <a:effectRef idx="1">
+            <a:schemeClr val="accent1"/>
+          </a:effectRef>
+          <a:fontRef idx="minor">
+            <a:schemeClr val="tx1"/>
+          </a:fontRef>
+        </p:style>
+      </p:cxnSp>
+      <p:cxnSp>
+        <p:nvCxnSpPr>
+          <p:cNvPr id="12" name="Straight Arrow Connector 11"/>
+          <p:cNvCxnSpPr/>
+          <p:nvPr/>
+        </p:nvCxnSpPr>
+        <p:spPr>
+          <a:xfrm rot="5400000" flipV="1">
+            <a:off x="2792313" y="2264398"/>
+            <a:ext cx="0" cy="457200"/>
+          </a:xfrm>
+          <a:prstGeom prst="straightConnector1">
+            <a:avLst/>
+          </a:prstGeom>
+          <a:ln w="31750" cap="flat" cmpd="sng" algn="ctr">
+            <a:solidFill>
+              <a:schemeClr val="tx1"/>
+            </a:solidFill>
+            <a:prstDash val="solid"/>
+            <a:round/>
+            <a:headEnd type="none" w="med" len="med"/>
+            <a:tailEnd type="none" w="lg" len="lg"/>
+          </a:ln>
+          <a:effectLst/>
+        </p:spPr>
+        <p:style>
+          <a:lnRef idx="2">
+            <a:schemeClr val="accent1"/>
+          </a:lnRef>
+          <a:fillRef idx="0">
+            <a:schemeClr val="accent1"/>
+          </a:fillRef>
+          <a:effectRef idx="1">
+            <a:schemeClr val="accent1"/>
+          </a:effectRef>
+          <a:fontRef idx="minor">
+            <a:schemeClr val="tx1"/>
+          </a:fontRef>
+        </p:style>
+      </p:cxnSp>
+      <p:cxnSp>
+        <p:nvCxnSpPr>
+          <p:cNvPr id="13" name="Straight Arrow Connector 12"/>
+          <p:cNvCxnSpPr/>
+          <p:nvPr/>
+        </p:nvCxnSpPr>
+        <p:spPr>
+          <a:xfrm rot="5400000" flipV="1">
+            <a:off x="2780853" y="1775013"/>
+            <a:ext cx="0" cy="457200"/>
+          </a:xfrm>
+          <a:prstGeom prst="straightConnector1">
+            <a:avLst/>
+          </a:prstGeom>
+          <a:ln w="31750" cap="flat" cmpd="sng" algn="ctr">
+            <a:solidFill>
+              <a:schemeClr val="tx1"/>
+            </a:solidFill>
+            <a:prstDash val="solid"/>
+            <a:round/>
+            <a:headEnd type="none" w="med" len="med"/>
+            <a:tailEnd type="none" w="lg" len="lg"/>
+          </a:ln>
+          <a:effectLst/>
+        </p:spPr>
+        <p:style>
+          <a:lnRef idx="2">
+            <a:schemeClr val="accent1"/>
+          </a:lnRef>
+          <a:fillRef idx="0">
+            <a:schemeClr val="accent1"/>
+          </a:fillRef>
+          <a:effectRef idx="1">
+            <a:schemeClr val="accent1"/>
+          </a:effectRef>
+          <a:fontRef idx="minor">
+            <a:schemeClr val="tx1"/>
+          </a:fontRef>
+        </p:style>
+      </p:cxnSp>
+      <p:cxnSp>
+        <p:nvCxnSpPr>
+          <p:cNvPr id="14" name="Straight Arrow Connector 13"/>
+          <p:cNvCxnSpPr/>
+          <p:nvPr/>
+        </p:nvCxnSpPr>
+        <p:spPr>
+          <a:xfrm rot="10800000" flipV="1">
+            <a:off x="2783044" y="2499583"/>
+            <a:ext cx="0" cy="457200"/>
+          </a:xfrm>
+          <a:prstGeom prst="straightConnector1">
+            <a:avLst/>
+          </a:prstGeom>
+          <a:ln w="31750" cap="flat" cmpd="sng" algn="ctr">
+            <a:solidFill>
+              <a:schemeClr val="tx1"/>
+            </a:solidFill>
+            <a:prstDash val="solid"/>
+            <a:round/>
+            <a:headEnd type="none" w="med" len="med"/>
+            <a:tailEnd type="none" w="lg" len="lg"/>
+          </a:ln>
+          <a:effectLst/>
+        </p:spPr>
+        <p:style>
+          <a:lnRef idx="2">
+            <a:schemeClr val="accent1"/>
+          </a:lnRef>
+          <a:fillRef idx="0">
+            <a:schemeClr val="accent1"/>
+          </a:fillRef>
+          <a:effectRef idx="1">
+            <a:schemeClr val="accent1"/>
+          </a:effectRef>
+          <a:fontRef idx="minor">
+            <a:schemeClr val="tx1"/>
+          </a:fontRef>
+        </p:style>
+      </p:cxnSp>
+      <p:cxnSp>
+        <p:nvCxnSpPr>
+          <p:cNvPr id="15" name="Straight Arrow Connector 14"/>
+          <p:cNvCxnSpPr/>
+          <p:nvPr/>
+        </p:nvCxnSpPr>
+        <p:spPr>
+          <a:xfrm rot="5400000" flipV="1">
+            <a:off x="3559188" y="2430453"/>
+            <a:ext cx="0" cy="457200"/>
+          </a:xfrm>
+          <a:prstGeom prst="straightConnector1">
+            <a:avLst/>
+          </a:prstGeom>
+          <a:ln w="31750" cap="flat" cmpd="sng" algn="ctr">
+            <a:solidFill>
+              <a:schemeClr val="tx1"/>
+            </a:solidFill>
+            <a:prstDash val="solid"/>
+            <a:round/>
+            <a:headEnd type="none" w="med" len="med"/>
+            <a:tailEnd type="none" w="lg" len="lg"/>
+          </a:ln>
+          <a:effectLst/>
+        </p:spPr>
+        <p:style>
+          <a:lnRef idx="2">
+            <a:schemeClr val="accent1"/>
+          </a:lnRef>
+          <a:fillRef idx="0">
+            <a:schemeClr val="accent1"/>
+          </a:fillRef>
+          <a:effectRef idx="1">
+            <a:schemeClr val="accent1"/>
+          </a:effectRef>
+          <a:fontRef idx="minor">
+            <a:schemeClr val="tx1"/>
+          </a:fontRef>
+        </p:style>
+      </p:cxnSp>
+      <p:cxnSp>
+        <p:nvCxnSpPr>
+          <p:cNvPr id="16" name="Straight Arrow Connector 15"/>
+          <p:cNvCxnSpPr/>
+          <p:nvPr/>
+        </p:nvCxnSpPr>
+        <p:spPr>
+          <a:xfrm rot="5400000" flipV="1">
+            <a:off x="3547728" y="1968378"/>
+            <a:ext cx="0" cy="457200"/>
+          </a:xfrm>
+          <a:prstGeom prst="straightConnector1">
+            <a:avLst/>
+          </a:prstGeom>
+          <a:ln w="31750" cap="flat" cmpd="sng" algn="ctr">
+            <a:solidFill>
+              <a:schemeClr val="tx1"/>
+            </a:solidFill>
+            <a:prstDash val="solid"/>
+            <a:round/>
+            <a:headEnd type="none" w="med" len="med"/>
+            <a:tailEnd type="none" w="lg" len="lg"/>
+          </a:ln>
+          <a:effectLst/>
+        </p:spPr>
+        <p:style>
+          <a:lnRef idx="2">
+            <a:schemeClr val="accent1"/>
+          </a:lnRef>
+          <a:fillRef idx="0">
+            <a:schemeClr val="accent1"/>
+          </a:fillRef>
+          <a:effectRef idx="1">
+            <a:schemeClr val="accent1"/>
+          </a:effectRef>
+          <a:fontRef idx="minor">
+            <a:schemeClr val="tx1"/>
+          </a:fontRef>
+        </p:style>
+      </p:cxnSp>
+      <p:cxnSp>
+        <p:nvCxnSpPr>
+          <p:cNvPr id="17" name="Straight Arrow Connector 16"/>
+          <p:cNvCxnSpPr/>
+          <p:nvPr/>
+        </p:nvCxnSpPr>
+        <p:spPr>
+          <a:xfrm rot="10800000" flipV="1">
+            <a:off x="3549919" y="2675514"/>
+            <a:ext cx="0" cy="283464"/>
+          </a:xfrm>
+          <a:prstGeom prst="straightConnector1">
+            <a:avLst/>
+          </a:prstGeom>
+          <a:ln w="31750" cap="flat" cmpd="sng" algn="ctr">
+            <a:solidFill>
+              <a:schemeClr val="tx1"/>
+            </a:solidFill>
+            <a:prstDash val="solid"/>
+            <a:round/>
+            <a:headEnd type="none" w="med" len="med"/>
+            <a:tailEnd type="none" w="lg" len="lg"/>
+          </a:ln>
+          <a:effectLst/>
+        </p:spPr>
+        <p:style>
+          <a:lnRef idx="2">
+            <a:schemeClr val="accent1"/>
+          </a:lnRef>
+          <a:fillRef idx="0">
+            <a:schemeClr val="accent1"/>
+          </a:fillRef>
+          <a:effectRef idx="1">
+            <a:schemeClr val="accent1"/>
+          </a:effectRef>
+          <a:fontRef idx="minor">
+            <a:schemeClr val="tx1"/>
+          </a:fontRef>
+        </p:style>
+      </p:cxnSp>
+      <p:cxnSp>
+        <p:nvCxnSpPr>
+          <p:cNvPr id="18" name="Straight Arrow Connector 17"/>
+          <p:cNvCxnSpPr/>
+          <p:nvPr/>
+        </p:nvCxnSpPr>
+        <p:spPr>
+          <a:xfrm rot="5400000" flipV="1">
+            <a:off x="4339718" y="2500923"/>
+            <a:ext cx="0" cy="457200"/>
+          </a:xfrm>
+          <a:prstGeom prst="straightConnector1">
+            <a:avLst/>
+          </a:prstGeom>
+          <a:ln w="31750" cap="flat" cmpd="sng" algn="ctr">
+            <a:solidFill>
+              <a:schemeClr val="tx1"/>
+            </a:solidFill>
+            <a:prstDash val="solid"/>
+            <a:round/>
+            <a:headEnd type="none" w="med" len="med"/>
+            <a:tailEnd type="none" w="lg" len="lg"/>
+          </a:ln>
+          <a:effectLst/>
+        </p:spPr>
+        <p:style>
+          <a:lnRef idx="2">
+            <a:schemeClr val="accent1"/>
+          </a:lnRef>
+          <a:fillRef idx="0">
+            <a:schemeClr val="accent1"/>
+          </a:fillRef>
+          <a:effectRef idx="1">
+            <a:schemeClr val="accent1"/>
+          </a:effectRef>
+          <a:fontRef idx="minor">
+            <a:schemeClr val="tx1"/>
+          </a:fontRef>
+        </p:style>
+      </p:cxnSp>
+      <p:cxnSp>
+        <p:nvCxnSpPr>
+          <p:cNvPr id="19" name="Straight Arrow Connector 18"/>
+          <p:cNvCxnSpPr/>
+          <p:nvPr/>
+        </p:nvCxnSpPr>
+        <p:spPr>
+          <a:xfrm rot="5400000" flipV="1">
+            <a:off x="4328258" y="2352913"/>
+            <a:ext cx="0" cy="457200"/>
+          </a:xfrm>
+          <a:prstGeom prst="straightConnector1">
+            <a:avLst/>
+          </a:prstGeom>
+          <a:ln w="31750" cap="flat" cmpd="sng" algn="ctr">
+            <a:solidFill>
+              <a:schemeClr val="tx1"/>
+            </a:solidFill>
+            <a:prstDash val="solid"/>
+            <a:round/>
+            <a:headEnd type="none" w="med" len="med"/>
+            <a:tailEnd type="none" w="lg" len="lg"/>
+          </a:ln>
+          <a:effectLst/>
+        </p:spPr>
+        <p:style>
+          <a:lnRef idx="2">
+            <a:schemeClr val="accent1"/>
+          </a:lnRef>
+          <a:fillRef idx="0">
+            <a:schemeClr val="accent1"/>
+          </a:fillRef>
+          <a:effectRef idx="1">
+            <a:schemeClr val="accent1"/>
+          </a:effectRef>
+          <a:fontRef idx="minor">
+            <a:schemeClr val="tx1"/>
+          </a:fontRef>
+        </p:style>
+      </p:cxnSp>
+      <p:cxnSp>
+        <p:nvCxnSpPr>
+          <p:cNvPr id="20" name="Straight Arrow Connector 19"/>
+          <p:cNvCxnSpPr/>
+          <p:nvPr/>
+        </p:nvCxnSpPr>
+        <p:spPr>
+          <a:xfrm rot="10800000" flipV="1">
+            <a:off x="4330449" y="2750862"/>
+            <a:ext cx="0" cy="210311"/>
+          </a:xfrm>
+          <a:prstGeom prst="straightConnector1">
+            <a:avLst/>
+          </a:prstGeom>
+          <a:ln w="31750" cap="flat" cmpd="sng" algn="ctr">
+            <a:solidFill>
+              <a:schemeClr val="tx1"/>
+            </a:solidFill>
+            <a:prstDash val="solid"/>
+            <a:round/>
+            <a:headEnd type="none" w="med" len="med"/>
+            <a:tailEnd type="none" w="lg" len="lg"/>
+          </a:ln>
+          <a:effectLst/>
+        </p:spPr>
+        <p:style>
+          <a:lnRef idx="2">
+            <a:schemeClr val="accent1"/>
+          </a:lnRef>
+          <a:fillRef idx="0">
+            <a:schemeClr val="accent1"/>
+          </a:fillRef>
+          <a:effectRef idx="1">
+            <a:schemeClr val="accent1"/>
+          </a:effectRef>
+          <a:fontRef idx="minor">
+            <a:schemeClr val="tx1"/>
+          </a:fontRef>
+        </p:style>
+      </p:cxnSp>
+      <p:cxnSp>
+        <p:nvCxnSpPr>
+          <p:cNvPr id="21" name="Straight Arrow Connector 20"/>
+          <p:cNvCxnSpPr/>
+          <p:nvPr/>
+        </p:nvCxnSpPr>
+        <p:spPr>
+          <a:xfrm rot="5400000" flipV="1">
+            <a:off x="5215833" y="2612358"/>
+            <a:ext cx="0" cy="457200"/>
+          </a:xfrm>
+          <a:prstGeom prst="straightConnector1">
+            <a:avLst/>
+          </a:prstGeom>
+          <a:ln w="31750" cap="flat" cmpd="sng" algn="ctr">
+            <a:solidFill>
+              <a:schemeClr val="tx1"/>
+            </a:solidFill>
+            <a:prstDash val="solid"/>
+            <a:round/>
+            <a:headEnd type="none" w="med" len="med"/>
+            <a:tailEnd type="none" w="lg" len="lg"/>
+          </a:ln>
+          <a:effectLst/>
+        </p:spPr>
+        <p:style>
+          <a:lnRef idx="2">
+            <a:schemeClr val="accent1"/>
+          </a:lnRef>
+          <a:fillRef idx="0">
+            <a:schemeClr val="accent1"/>
+          </a:fillRef>
+          <a:effectRef idx="1">
+            <a:schemeClr val="accent1"/>
+          </a:effectRef>
+          <a:fontRef idx="minor">
+            <a:schemeClr val="tx1"/>
+          </a:fontRef>
+        </p:style>
+      </p:cxnSp>
+      <p:cxnSp>
+        <p:nvCxnSpPr>
+          <p:cNvPr id="22" name="Straight Arrow Connector 21"/>
+          <p:cNvCxnSpPr/>
+          <p:nvPr/>
+        </p:nvCxnSpPr>
+        <p:spPr>
+          <a:xfrm rot="5400000" flipV="1">
+            <a:off x="5204373" y="2382418"/>
+            <a:ext cx="0" cy="457200"/>
+          </a:xfrm>
+          <a:prstGeom prst="straightConnector1">
+            <a:avLst/>
+          </a:prstGeom>
+          <a:ln w="31750" cap="flat" cmpd="sng" algn="ctr">
+            <a:solidFill>
+              <a:schemeClr val="tx1"/>
+            </a:solidFill>
+            <a:prstDash val="solid"/>
+            <a:round/>
+            <a:headEnd type="none" w="med" len="med"/>
+            <a:tailEnd type="none" w="lg" len="lg"/>
+          </a:ln>
+          <a:effectLst/>
+        </p:spPr>
+        <p:style>
+          <a:lnRef idx="2">
+            <a:schemeClr val="accent1"/>
+          </a:lnRef>
+          <a:fillRef idx="0">
+            <a:schemeClr val="accent1"/>
+          </a:fillRef>
+          <a:effectRef idx="1">
+            <a:schemeClr val="accent1"/>
+          </a:effectRef>
+          <a:fontRef idx="minor">
+            <a:schemeClr val="tx1"/>
+          </a:fontRef>
+        </p:style>
+      </p:cxnSp>
+      <p:cxnSp>
+        <p:nvCxnSpPr>
+          <p:cNvPr id="23" name="Straight Arrow Connector 22"/>
+          <p:cNvCxnSpPr/>
+          <p:nvPr/>
+        </p:nvCxnSpPr>
+        <p:spPr>
+          <a:xfrm rot="10800000" flipV="1">
+            <a:off x="5206564" y="2839989"/>
+            <a:ext cx="0" cy="109720"/>
+          </a:xfrm>
+          <a:prstGeom prst="straightConnector1">
+            <a:avLst/>
+          </a:prstGeom>
+          <a:ln w="31750" cap="flat" cmpd="sng" algn="ctr">
+            <a:solidFill>
+              <a:schemeClr val="tx1"/>
+            </a:solidFill>
+            <a:prstDash val="solid"/>
+            <a:round/>
+            <a:headEnd type="none" w="med" len="med"/>
+            <a:tailEnd type="none" w="lg" len="lg"/>
+          </a:ln>
+          <a:effectLst/>
+        </p:spPr>
+        <p:style>
+          <a:lnRef idx="2">
+            <a:schemeClr val="accent1"/>
+          </a:lnRef>
+          <a:fillRef idx="0">
+            <a:schemeClr val="accent1"/>
+          </a:fillRef>
+          <a:effectRef idx="1">
+            <a:schemeClr val="accent1"/>
+          </a:effectRef>
+          <a:fontRef idx="minor">
+            <a:schemeClr val="tx1"/>
+          </a:fontRef>
+        </p:style>
+      </p:cxnSp>
+      <p:cxnSp>
+        <p:nvCxnSpPr>
+          <p:cNvPr id="24" name="Straight Arrow Connector 23"/>
+          <p:cNvCxnSpPr/>
+          <p:nvPr/>
+        </p:nvCxnSpPr>
+        <p:spPr>
+          <a:xfrm rot="5400000" flipV="1">
+            <a:off x="3666462" y="203412"/>
+            <a:ext cx="0" cy="4572000"/>
+          </a:xfrm>
+          <a:prstGeom prst="straightConnector1">
+            <a:avLst/>
+          </a:prstGeom>
+          <a:ln w="31750" cap="flat" cmpd="sng" algn="ctr">
+            <a:solidFill>
+              <a:srgbClr val="FF0000"/>
+            </a:solidFill>
+            <a:prstDash val="dash"/>
+            <a:round/>
+            <a:headEnd type="none" w="med" len="med"/>
+            <a:tailEnd type="none" w="lg" len="lg"/>
+          </a:ln>
+          <a:effectLst/>
+        </p:spPr>
+        <p:style>
+          <a:lnRef idx="2">
+            <a:schemeClr val="accent1"/>
+          </a:lnRef>
+          <a:fillRef idx="0">
+            <a:schemeClr val="accent1"/>
+          </a:fillRef>
+          <a:effectRef idx="1">
+            <a:schemeClr val="accent1"/>
+          </a:effectRef>
+          <a:fontRef idx="minor">
+            <a:schemeClr val="tx1"/>
+          </a:fontRef>
+        </p:style>
+      </p:cxnSp>
+      <p:sp>
+        <p:nvSpPr>
+          <p:cNvPr id="25" name="TextBox 24"/>
+          <p:cNvSpPr txBox="1"/>
+          <p:nvPr/>
+        </p:nvSpPr>
+        <p:spPr>
+          <a:xfrm>
+            <a:off x="1771723" y="1124054"/>
+            <a:ext cx="468660" cy="369332"/>
+          </a:xfrm>
+          <a:prstGeom prst="rect">
+            <a:avLst/>
+          </a:prstGeom>
+          <a:noFill/>
+        </p:spPr>
+        <p:txBody>
+          <a:bodyPr wrap="square" rtlCol="0">
+            <a:spAutoFit/>
+          </a:bodyPr>
+          <a:lstStyle/>
+          <a:p>
+            <a:r>
+              <a:rPr lang="en-US" dirty="0" smtClean="0"/>
+              <a:t>V</a:t>
+            </a:r>
+            <a:r>
+              <a:rPr lang="en-US" baseline="-25000" dirty="0" smtClean="0"/>
+              <a:t>1</a:t>
+            </a:r>
+            <a:endParaRPr lang="en-US" baseline="-25000" dirty="0"/>
+          </a:p>
+        </p:txBody>
+      </p:sp>
+      <p:sp>
+        <p:nvSpPr>
+          <p:cNvPr id="26" name="TextBox 25"/>
+          <p:cNvSpPr txBox="1"/>
+          <p:nvPr/>
+        </p:nvSpPr>
+        <p:spPr>
+          <a:xfrm>
+            <a:off x="2552253" y="1564458"/>
+            <a:ext cx="468660" cy="369332"/>
+          </a:xfrm>
+          <a:prstGeom prst="rect">
+            <a:avLst/>
+          </a:prstGeom>
+          <a:noFill/>
+        </p:spPr>
+        <p:txBody>
+          <a:bodyPr wrap="square" rtlCol="0">
+            <a:spAutoFit/>
+          </a:bodyPr>
+          <a:lstStyle/>
+          <a:p>
+            <a:r>
+              <a:rPr lang="en-US" dirty="0" smtClean="0"/>
+              <a:t>V</a:t>
+            </a:r>
+            <a:r>
+              <a:rPr lang="en-US" baseline="-25000" dirty="0"/>
+              <a:t>2</a:t>
+            </a:r>
+          </a:p>
+        </p:txBody>
+      </p:sp>
+      <p:sp>
+        <p:nvSpPr>
+          <p:cNvPr id="27" name="TextBox 26"/>
+          <p:cNvSpPr txBox="1"/>
+          <p:nvPr/>
+        </p:nvSpPr>
+        <p:spPr>
+          <a:xfrm>
+            <a:off x="3315589" y="1734296"/>
+            <a:ext cx="468660" cy="369332"/>
+          </a:xfrm>
+          <a:prstGeom prst="rect">
+            <a:avLst/>
+          </a:prstGeom>
+          <a:noFill/>
+        </p:spPr>
+        <p:txBody>
+          <a:bodyPr wrap="square" rtlCol="0">
+            <a:spAutoFit/>
+          </a:bodyPr>
+          <a:lstStyle/>
+          <a:p>
+            <a:r>
+              <a:rPr lang="en-US" dirty="0" smtClean="0"/>
+              <a:t>V</a:t>
+            </a:r>
+            <a:r>
+              <a:rPr lang="en-US" baseline="-25000" dirty="0"/>
+              <a:t>3</a:t>
+            </a:r>
+          </a:p>
+        </p:txBody>
+      </p:sp>
+      <p:sp>
+        <p:nvSpPr>
+          <p:cNvPr id="28" name="TextBox 27"/>
+          <p:cNvSpPr txBox="1"/>
+          <p:nvPr/>
+        </p:nvSpPr>
+        <p:spPr>
+          <a:xfrm>
+            <a:off x="4111118" y="2062663"/>
+            <a:ext cx="468660" cy="369332"/>
+          </a:xfrm>
+          <a:prstGeom prst="rect">
+            <a:avLst/>
+          </a:prstGeom>
+          <a:noFill/>
+        </p:spPr>
+        <p:txBody>
+          <a:bodyPr wrap="square" rtlCol="0">
+            <a:spAutoFit/>
+          </a:bodyPr>
+          <a:lstStyle/>
+          <a:p>
+            <a:r>
+              <a:rPr lang="en-US" dirty="0" smtClean="0"/>
+              <a:t>V</a:t>
+            </a:r>
+            <a:r>
+              <a:rPr lang="en-US" baseline="-25000" dirty="0" smtClean="0"/>
+              <a:t>4</a:t>
+            </a:r>
+            <a:endParaRPr lang="en-US" baseline="-25000" dirty="0"/>
+          </a:p>
+        </p:txBody>
+      </p:sp>
+      <p:sp>
+        <p:nvSpPr>
+          <p:cNvPr id="29" name="TextBox 28"/>
+          <p:cNvSpPr txBox="1"/>
+          <p:nvPr/>
+        </p:nvSpPr>
+        <p:spPr>
+          <a:xfrm>
+            <a:off x="4987233" y="2088567"/>
+            <a:ext cx="468660" cy="369332"/>
+          </a:xfrm>
+          <a:prstGeom prst="rect">
+            <a:avLst/>
+          </a:prstGeom>
+          <a:noFill/>
+        </p:spPr>
+        <p:txBody>
+          <a:bodyPr wrap="square" rtlCol="0">
+            <a:spAutoFit/>
+          </a:bodyPr>
+          <a:lstStyle/>
+          <a:p>
+            <a:r>
+              <a:rPr lang="en-US" dirty="0" smtClean="0"/>
+              <a:t>V</a:t>
+            </a:r>
+            <a:r>
+              <a:rPr lang="en-US" baseline="-25000" dirty="0"/>
+              <a:t>5</a:t>
+            </a:r>
+          </a:p>
+        </p:txBody>
+      </p:sp>
+      <p:sp>
+        <p:nvSpPr>
+          <p:cNvPr id="30" name="TextBox 29"/>
+          <p:cNvSpPr txBox="1"/>
+          <p:nvPr/>
+        </p:nvSpPr>
+        <p:spPr>
+          <a:xfrm rot="16200000">
+            <a:off x="710077" y="1957656"/>
+            <a:ext cx="806935" cy="369332"/>
+          </a:xfrm>
+          <a:prstGeom prst="rect">
+            <a:avLst/>
+          </a:prstGeom>
+          <a:noFill/>
+        </p:spPr>
+        <p:txBody>
+          <a:bodyPr wrap="square" rtlCol="0">
+            <a:spAutoFit/>
+          </a:bodyPr>
+          <a:lstStyle/>
+          <a:p>
+            <a:r>
+              <a:rPr lang="en-US" dirty="0" smtClean="0"/>
+              <a:t>Utility</a:t>
+            </a:r>
+            <a:endParaRPr lang="en-US" dirty="0"/>
+          </a:p>
+        </p:txBody>
+      </p:sp>
+      <p:sp>
+        <p:nvSpPr>
+          <p:cNvPr id="31" name="TextBox 30"/>
+          <p:cNvSpPr txBox="1"/>
+          <p:nvPr/>
+        </p:nvSpPr>
+        <p:spPr>
+          <a:xfrm>
+            <a:off x="2825354" y="2990342"/>
+            <a:ext cx="997666" cy="369332"/>
+          </a:xfrm>
+          <a:prstGeom prst="rect">
+            <a:avLst/>
+          </a:prstGeom>
+          <a:noFill/>
+        </p:spPr>
+        <p:txBody>
+          <a:bodyPr wrap="square" rtlCol="0">
+            <a:spAutoFit/>
+          </a:bodyPr>
+          <a:lstStyle/>
+          <a:p>
+            <a:r>
+              <a:rPr lang="en-US" dirty="0" smtClean="0"/>
+              <a:t>Views</a:t>
+            </a:r>
+            <a:endParaRPr lang="en-US" dirty="0"/>
+          </a:p>
+        </p:txBody>
+      </p:sp>
+    </p:spTree>
+    <p:extLst>
+      <p:ext uri="{BB962C8B-B14F-4D97-AF65-F5344CB8AC3E}">
+        <p14:creationId xmlns:p14="http://schemas.microsoft.com/office/powerpoint/2010/main" val="3843508963"/>
       </p:ext>
     </p:extLst>
   </p:cSld>

</xml_diff>